<commit_message>
PPT optimization + better examples
</commit_message>
<xml_diff>
--- a/avoid-orms.pptx
+++ b/avoid-orms.pptx
@@ -7,19 +7,21 @@
   <p:sldIdLst>
     <p:sldId id="256" r:id="rId2"/>
     <p:sldId id="257" r:id="rId3"/>
-    <p:sldId id="263" r:id="rId4"/>
-    <p:sldId id="259" r:id="rId5"/>
-    <p:sldId id="258" r:id="rId6"/>
-    <p:sldId id="260" r:id="rId7"/>
-    <p:sldId id="261" r:id="rId8"/>
-    <p:sldId id="262" r:id="rId9"/>
+    <p:sldId id="272" r:id="rId4"/>
+    <p:sldId id="263" r:id="rId5"/>
+    <p:sldId id="259" r:id="rId6"/>
+    <p:sldId id="258" r:id="rId7"/>
+    <p:sldId id="260" r:id="rId8"/>
+    <p:sldId id="261" r:id="rId9"/>
     <p:sldId id="264" r:id="rId10"/>
     <p:sldId id="265" r:id="rId11"/>
     <p:sldId id="266" r:id="rId12"/>
     <p:sldId id="267" r:id="rId13"/>
-    <p:sldId id="268" r:id="rId14"/>
-    <p:sldId id="269" r:id="rId15"/>
-    <p:sldId id="270" r:id="rId16"/>
+    <p:sldId id="262" r:id="rId14"/>
+    <p:sldId id="268" r:id="rId15"/>
+    <p:sldId id="269" r:id="rId16"/>
+    <p:sldId id="271" r:id="rId17"/>
+    <p:sldId id="270" r:id="rId18"/>
   </p:sldIdLst>
   <p:sldSz cx="12192000" cy="6858000"/>
   <p:notesSz cx="6858000" cy="9144000"/>
@@ -118,6 +120,11 @@
       </a:defRPr>
     </a:lvl9pPr>
   </p:defaultTextStyle>
+  <p:extLst>
+    <p:ext uri="{EFAFB233-063F-42B5-8137-9DF3F51BA10A}">
+      <p15:sldGuideLst xmlns:p15="http://schemas.microsoft.com/office/powerpoint/2012/main"/>
+    </p:ext>
+  </p:extLst>
 </p:presentation>
 </file>
 
@@ -285,7 +292,7 @@
             <a:fld id="{08B9EBBA-996F-894A-B54A-D6246ED52CEA}" type="datetimeFigureOut">
               <a:rPr lang="en-US" smtClean="0"/>
               <a:pPr/>
-              <a:t>6/11/19</a:t>
+              <a:t>7/28/19</a:t>
             </a:fld>
             <a:endParaRPr lang="en-US" dirty="0"/>
           </a:p>
@@ -457,7 +464,7 @@
             <a:fld id="{C6C52C72-DE31-F449-A4ED-4C594FD91407}" type="datetimeFigureOut">
               <a:rPr lang="en-US" smtClean="0"/>
               <a:pPr/>
-              <a:t>6/11/19</a:t>
+              <a:t>7/28/19</a:t>
             </a:fld>
             <a:endParaRPr lang="en-US" dirty="0"/>
           </a:p>
@@ -639,7 +646,7 @@
             <a:fld id="{ED62726E-379B-B349-9EED-81ED093FA806}" type="datetimeFigureOut">
               <a:rPr lang="en-US" smtClean="0"/>
               <a:pPr/>
-              <a:t>6/11/19</a:t>
+              <a:t>7/28/19</a:t>
             </a:fld>
             <a:endParaRPr lang="en-US" dirty="0"/>
           </a:p>
@@ -954,7 +961,7 @@
             <a:fld id="{18C79C5D-2A6F-F04D-97DA-BEF2467B64E4}" type="datetimeFigureOut">
               <a:rPr lang="en-US" dirty="0"/>
               <a:pPr/>
-              <a:t>6/11/19</a:t>
+              <a:t>7/28/19</a:t>
             </a:fld>
             <a:endParaRPr lang="en-US" dirty="0"/>
           </a:p>
@@ -1136,7 +1143,7 @@
             <a:fld id="{9B3A1323-8D79-1946-B0D7-40001CF92E9D}" type="datetimeFigureOut">
               <a:rPr lang="en-US" smtClean="0"/>
               <a:pPr/>
-              <a:t>6/11/19</a:t>
+              <a:t>7/28/19</a:t>
             </a:fld>
             <a:endParaRPr lang="en-US" dirty="0"/>
           </a:p>
@@ -1406,7 +1413,7 @@
             <a:fld id="{8DFA1846-DA80-1C48-A609-854EA85C59AD}" type="datetimeFigureOut">
               <a:rPr lang="en-US" smtClean="0"/>
               <a:pPr/>
-              <a:t>6/11/19</a:t>
+              <a:t>7/28/19</a:t>
             </a:fld>
             <a:endParaRPr lang="en-US" dirty="0"/>
           </a:p>
@@ -1640,7 +1647,7 @@
             <a:fld id="{57302355-E14B-8545-A8F8-0FE83CC9D524}" type="datetimeFigureOut">
               <a:rPr lang="en-US" smtClean="0"/>
               <a:pPr/>
-              <a:t>6/11/19</a:t>
+              <a:t>7/28/19</a:t>
             </a:fld>
             <a:endParaRPr lang="en-US" dirty="0"/>
           </a:p>
@@ -2001,7 +2008,7 @@
             <a:fld id="{09B482E8-6E0E-1B4F-B1FD-C69DB9E858D9}" type="datetimeFigureOut">
               <a:rPr lang="en-US" smtClean="0"/>
               <a:pPr/>
-              <a:t>6/11/19</a:t>
+              <a:t>7/28/19</a:t>
             </a:fld>
             <a:endParaRPr lang="en-US" dirty="0"/>
           </a:p>
@@ -2145,7 +2152,7 @@
             <a:fld id="{F13A34C8-038E-2045-AF43-DF7DBB8E0E9E}" type="datetimeFigureOut">
               <a:rPr lang="en-US" smtClean="0"/>
               <a:pPr/>
-              <a:t>6/11/19</a:t>
+              <a:t>7/28/19</a:t>
             </a:fld>
             <a:endParaRPr lang="en-US" dirty="0"/>
           </a:p>
@@ -2242,7 +2249,7 @@
             <a:fld id="{8818C68F-D26B-8F47-958C-23B49CF8A634}" type="datetimeFigureOut">
               <a:rPr lang="en-US" smtClean="0"/>
               <a:pPr/>
-              <a:t>6/11/19</a:t>
+              <a:t>7/28/19</a:t>
             </a:fld>
             <a:endParaRPr lang="en-US" dirty="0"/>
           </a:p>
@@ -2601,7 +2608,7 @@
             <a:fld id="{D0DF5E60-9974-AC48-9591-99C2BB44B7CF}" type="datetimeFigureOut">
               <a:rPr lang="en-US" smtClean="0"/>
               <a:pPr/>
-              <a:t>6/11/19</a:t>
+              <a:t>7/28/19</a:t>
             </a:fld>
             <a:endParaRPr lang="en-US" dirty="0"/>
           </a:p>
@@ -2960,7 +2967,7 @@
             <a:fld id="{09B482E8-6E0E-1B4F-B1FD-C69DB9E858D9}" type="datetimeFigureOut">
               <a:rPr lang="en-US" smtClean="0"/>
               <a:pPr/>
-              <a:t>6/11/19</a:t>
+              <a:t>7/28/19</a:t>
             </a:fld>
             <a:endParaRPr lang="en-US" dirty="0"/>
           </a:p>
@@ -3205,7 +3212,7 @@
             <a:fld id="{09B482E8-6E0E-1B4F-B1FD-C69DB9E858D9}" type="datetimeFigureOut">
               <a:rPr lang="en-US" smtClean="0"/>
               <a:pPr/>
-              <a:t>6/11/19</a:t>
+              <a:t>7/28/19</a:t>
             </a:fld>
             <a:endParaRPr lang="en-US" dirty="0"/>
           </a:p>
@@ -3716,6 +3723,12 @@
               <a:t>Daniel Golub</a:t>
             </a:r>
           </a:p>
+          <a:p>
+            <a:r>
+              <a:rPr lang="en-US" dirty="0"/>
+              <a:t>Senior Backend Engineer @ Autodesk</a:t>
+            </a:r>
+          </a:p>
         </p:txBody>
       </p:sp>
     </p:spTree>
@@ -3986,7 +3999,7 @@
           <a:lstStyle/>
           <a:p>
             <a:r>
-              <a:rPr lang="en-US" sz="2600">
+              <a:rPr lang="en-US" sz="2600" dirty="0">
                 <a:solidFill>
                   <a:srgbClr val="FFFFFF"/>
                 </a:solidFill>
@@ -4742,6 +4755,187 @@
 </file>
 
 <file path=ppt/slides/slide13.xml><?xml version="1.0" encoding="utf-8"?>
+<p:sld xmlns:a="http://schemas.openxmlformats.org/drawingml/2006/main" xmlns:r="http://schemas.openxmlformats.org/officeDocument/2006/relationships" xmlns:p="http://schemas.openxmlformats.org/presentationml/2006/main">
+  <p:cSld>
+    <p:spTree>
+      <p:nvGrpSpPr>
+        <p:cNvPr id="1" name=""/>
+        <p:cNvGrpSpPr/>
+        <p:nvPr/>
+      </p:nvGrpSpPr>
+      <p:grpSpPr>
+        <a:xfrm>
+          <a:off x="0" y="0"/>
+          <a:ext cx="0" cy="0"/>
+          <a:chOff x="0" y="0"/>
+          <a:chExt cx="0" cy="0"/>
+        </a:xfrm>
+      </p:grpSpPr>
+      <p:sp>
+        <p:nvSpPr>
+          <p:cNvPr id="2" name="Title 1">
+            <a:extLst>
+              <a:ext uri="{FF2B5EF4-FFF2-40B4-BE49-F238E27FC236}">
+                <a16:creationId xmlns:a16="http://schemas.microsoft.com/office/drawing/2014/main" id="{E792511F-CEB8-7041-966C-AE77F40B6A47}"/>
+              </a:ext>
+            </a:extLst>
+          </p:cNvPr>
+          <p:cNvSpPr>
+            <a:spLocks noGrp="1"/>
+          </p:cNvSpPr>
+          <p:nvPr>
+            <p:ph type="title"/>
+          </p:nvPr>
+        </p:nvSpPr>
+        <p:spPr/>
+        <p:txBody>
+          <a:bodyPr/>
+          <a:lstStyle/>
+          <a:p>
+            <a:r>
+              <a:rPr lang="en-US" dirty="0" err="1"/>
+              <a:t>Sequelize</a:t>
+            </a:r>
+            <a:r>
+              <a:rPr lang="en-US" dirty="0"/>
+              <a:t>-specific limitations</a:t>
+            </a:r>
+          </a:p>
+        </p:txBody>
+      </p:sp>
+      <p:sp>
+        <p:nvSpPr>
+          <p:cNvPr id="3" name="Content Placeholder 2">
+            <a:extLst>
+              <a:ext uri="{FF2B5EF4-FFF2-40B4-BE49-F238E27FC236}">
+                <a16:creationId xmlns:a16="http://schemas.microsoft.com/office/drawing/2014/main" id="{302FE5B9-62BA-A447-B7C6-C0A71BA71993}"/>
+              </a:ext>
+            </a:extLst>
+          </p:cNvPr>
+          <p:cNvSpPr>
+            <a:spLocks noGrp="1"/>
+          </p:cNvSpPr>
+          <p:nvPr>
+            <p:ph idx="1"/>
+          </p:nvPr>
+        </p:nvSpPr>
+        <p:spPr/>
+        <p:txBody>
+          <a:bodyPr/>
+          <a:lstStyle/>
+          <a:p>
+            <a:pPr>
+              <a:buClr>
+                <a:srgbClr val="FF0000"/>
+              </a:buClr>
+            </a:pPr>
+            <a:r>
+              <a:rPr lang="en-US" dirty="0"/>
+              <a:t>No support for composite primary key (when using foreign keys) – </a:t>
+            </a:r>
+            <a:r>
+              <a:rPr lang="en-US" dirty="0">
+                <a:hlinkClick r:id="rId2"/>
+              </a:rPr>
+              <a:t>reference</a:t>
+            </a:r>
+            <a:endParaRPr lang="en-US" dirty="0"/>
+          </a:p>
+          <a:p>
+            <a:pPr>
+              <a:buClr>
+                <a:srgbClr val="FF0000"/>
+              </a:buClr>
+            </a:pPr>
+            <a:r>
+              <a:rPr lang="en-US" dirty="0"/>
+              <a:t>Limited support to the types of joins you can use (have to tweak around with association types to see an impact)</a:t>
+            </a:r>
+          </a:p>
+          <a:p>
+            <a:pPr>
+              <a:buClr>
+                <a:srgbClr val="FF0000"/>
+              </a:buClr>
+            </a:pPr>
+            <a:r>
+              <a:rPr lang="en-US" dirty="0"/>
+              <a:t>Very abstract </a:t>
+            </a:r>
+            <a:r>
+              <a:rPr lang="en-US" dirty="0" err="1"/>
+              <a:t>sql</a:t>
+            </a:r>
+            <a:r>
+              <a:rPr lang="en-US" dirty="0"/>
+              <a:t> query that is hard to debug</a:t>
+            </a:r>
+          </a:p>
+          <a:p>
+            <a:pPr>
+              <a:buClr>
+                <a:srgbClr val="FF0000"/>
+              </a:buClr>
+            </a:pPr>
+            <a:r>
+              <a:rPr lang="en-US" dirty="0"/>
+              <a:t>Very easy to use filters without them being primary keys or secondary indexes</a:t>
+            </a:r>
+          </a:p>
+          <a:p>
+            <a:pPr>
+              <a:buClr>
+                <a:srgbClr val="FF0000"/>
+              </a:buClr>
+            </a:pPr>
+            <a:r>
+              <a:rPr lang="en-US" dirty="0"/>
+              <a:t>Foreign key representation is pretty hard (especially Many-to-Many)</a:t>
+            </a:r>
+          </a:p>
+          <a:p>
+            <a:pPr>
+              <a:buClr>
+                <a:srgbClr val="FF0000"/>
+              </a:buClr>
+            </a:pPr>
+            <a:r>
+              <a:rPr lang="en-US" dirty="0"/>
+              <a:t>Models force you to have “default” properties (i.e. </a:t>
+            </a:r>
+            <a:r>
+              <a:rPr lang="en-US" dirty="0" err="1"/>
+              <a:t>createdAt</a:t>
+            </a:r>
+            <a:r>
+              <a:rPr lang="en-US" dirty="0"/>
+              <a:t>, </a:t>
+            </a:r>
+            <a:r>
+              <a:rPr lang="en-US" dirty="0" err="1"/>
+              <a:t>updatedAt</a:t>
+            </a:r>
+            <a:r>
+              <a:rPr lang="en-US" dirty="0"/>
+              <a:t>), and these may be disabled via some extra configuration</a:t>
+            </a:r>
+          </a:p>
+        </p:txBody>
+      </p:sp>
+    </p:spTree>
+    <p:extLst>
+      <p:ext uri="{BB962C8B-B14F-4D97-AF65-F5344CB8AC3E}">
+        <p14:creationId xmlns:p14="http://schemas.microsoft.com/office/powerpoint/2010/main" val="720539651"/>
+      </p:ext>
+    </p:extLst>
+  </p:cSld>
+  <p:clrMapOvr>
+    <a:masterClrMapping/>
+  </p:clrMapOvr>
+</p:sld>
+</file>
+
+<file path=ppt/slides/slide14.xml><?xml version="1.0" encoding="utf-8"?>
 <p:sld xmlns:a="http://schemas.openxmlformats.org/drawingml/2006/main" xmlns:r="http://schemas.openxmlformats.org/officeDocument/2006/relationships" xmlns:p="http://schemas.openxmlformats.org/presentationml/2006/main">
   <p:cSld>
     <p:bg>
@@ -4976,7 +5170,7 @@
 </p:sld>
 </file>
 
-<file path=ppt/slides/slide14.xml><?xml version="1.0" encoding="utf-8"?>
+<file path=ppt/slides/slide15.xml><?xml version="1.0" encoding="utf-8"?>
 <p:sld xmlns:a="http://schemas.openxmlformats.org/drawingml/2006/main" xmlns:r="http://schemas.openxmlformats.org/officeDocument/2006/relationships" xmlns:p="http://schemas.openxmlformats.org/presentationml/2006/main">
   <p:cSld>
     <p:spTree>
@@ -5009,15 +5203,21 @@
             <p:ph type="title"/>
           </p:nvPr>
         </p:nvSpPr>
-        <p:spPr/>
+        <p:spPr>
+          <a:xfrm>
+            <a:off x="2231136" y="544562"/>
+            <a:ext cx="7729728" cy="1188720"/>
+          </a:xfrm>
+        </p:spPr>
         <p:txBody>
           <a:bodyPr/>
           <a:lstStyle/>
           <a:p>
             <a:r>
-              <a:rPr lang="en-US" dirty="0"/>
+              <a:rPr lang="en-US"/>
               <a:t>The sweet spot: query builders</a:t>
             </a:r>
+            <a:endParaRPr lang="en-US" dirty="0"/>
           </a:p>
         </p:txBody>
       </p:sp>
@@ -5037,34 +5237,29 @@
             <p:ph idx="1"/>
           </p:nvPr>
         </p:nvSpPr>
-        <p:spPr/>
+        <p:spPr>
+          <a:xfrm>
+            <a:off x="2231136" y="1995492"/>
+            <a:ext cx="7729728" cy="4417664"/>
+          </a:xfrm>
+        </p:spPr>
         <p:txBody>
           <a:bodyPr>
-            <a:normAutofit fontScale="92500" lnSpcReduction="10000"/>
+            <a:normAutofit lnSpcReduction="10000"/>
           </a:bodyPr>
           <a:lstStyle/>
           <a:p>
-            <a:pPr marL="0" indent="0">
+            <a:pPr>
+              <a:lnSpc>
+                <a:spcPct val="150000"/>
+              </a:lnSpc>
               <a:buClr>
-                <a:srgbClr val="FF0000"/>
+                <a:schemeClr val="tx1"/>
               </a:buClr>
-              <a:buNone/>
             </a:pPr>
             <a:r>
               <a:rPr lang="en-US" dirty="0"/>
-              <a:t>While using the low-level driver is tempting for obvious reasons (no overhead at generating queries, less dependencies in your project, understanding exactly what you’re doing), its biggest drawback to my opinion is generating dynamic queries.</a:t>
-            </a:r>
-          </a:p>
-          <a:p>
-            <a:pPr marL="0" indent="0">
-              <a:buClr>
-                <a:srgbClr val="FF0000"/>
-              </a:buClr>
-              <a:buNone/>
-            </a:pPr>
-            <a:r>
-              <a:rPr lang="en-US" dirty="0"/>
-              <a:t>For example, if we got 2 optional filters, we got 4 query options, and by using a simple </a:t>
+              <a:t>Low level </a:t>
             </a:r>
             <a:r>
               <a:rPr lang="en-US" dirty="0" err="1"/>
@@ -5072,43 +5267,57 @@
             </a:r>
             <a:r>
               <a:rPr lang="en-US" dirty="0"/>
-              <a:t> driver, our code will have lots of if conditions.</a:t>
-            </a:r>
-          </a:p>
-          <a:p>
-            <a:pPr marL="0" indent="0">
+              <a:t> drivers are tempting for their flexibility, but one of their biggest drawback is dynamic queries</a:t>
+            </a:r>
+          </a:p>
+          <a:p>
+            <a:pPr>
+              <a:lnSpc>
+                <a:spcPct val="150000"/>
+              </a:lnSpc>
               <a:buClr>
-                <a:srgbClr val="FF0000"/>
+                <a:schemeClr val="tx1"/>
               </a:buClr>
-              <a:buNone/>
             </a:pPr>
             <a:r>
               <a:rPr lang="en-US" dirty="0"/>
-              <a:t>However, a fully-featured ORM is definitely not the solution for this simple problem. </a:t>
-            </a:r>
-          </a:p>
-          <a:p>
-            <a:pPr marL="0" indent="0">
+              <a:t>ORMs solve lots of problems, but they are hard to maintain looking forward (especially concerning analysis and optimization on low-performance queries)</a:t>
+            </a:r>
+          </a:p>
+          <a:p>
+            <a:pPr>
+              <a:lnSpc>
+                <a:spcPct val="150000"/>
+              </a:lnSpc>
               <a:buClr>
-                <a:srgbClr val="FF0000"/>
+                <a:schemeClr val="tx1"/>
               </a:buClr>
-              <a:buNone/>
             </a:pPr>
             <a:r>
               <a:rPr lang="en-US" dirty="0"/>
-              <a:t>Query Builders are very similar to the underlying query language – this relationship can be seemed as TypeScript and plain JS.</a:t>
-            </a:r>
-          </a:p>
-          <a:p>
-            <a:pPr marL="0" indent="0">
+              <a:t>Query Builders are very similar to the underlying query language, but still provide a language-specific interfaces.</a:t>
+            </a:r>
+          </a:p>
+          <a:p>
+            <a:pPr>
+              <a:lnSpc>
+                <a:spcPct val="150000"/>
+              </a:lnSpc>
               <a:buClr>
-                <a:srgbClr val="FF0000"/>
+                <a:schemeClr val="tx1"/>
               </a:buClr>
-              <a:buNone/>
             </a:pPr>
             <a:r>
               <a:rPr lang="en-US" dirty="0"/>
-              <a:t>Using query builders are fine </a:t>
+              <a:t>But anyway, no matter which </a:t>
+            </a:r>
+            <a:r>
+              <a:rPr lang="en-US" dirty="0" err="1"/>
+              <a:t>db</a:t>
+            </a:r>
+            <a:r>
+              <a:rPr lang="en-US" dirty="0"/>
+              <a:t> abstraction layer you use – its good </a:t>
             </a:r>
             <a:r>
               <a:rPr lang="en-US" b="1" dirty="0"/>
@@ -5120,11 +5329,18 @@
             </a:r>
             <a:r>
               <a:rPr lang="en-US" b="1" dirty="0"/>
-              <a:t> query it is generating</a:t>
+              <a:t> query it is generating, and able to debug and optimize it</a:t>
             </a:r>
             <a:r>
               <a:rPr lang="en-US" dirty="0"/>
-              <a:t>. Never use a tool to hide the “magic” of the lower layer.</a:t>
+              <a:t>.</a:t>
+            </a:r>
+            <a:br>
+              <a:rPr lang="en-US" dirty="0"/>
+            </a:br>
+            <a:r>
+              <a:rPr lang="en-US" dirty="0"/>
+              <a:t>Never use a tool to hide the “magic” of the lower layer.</a:t>
             </a:r>
           </a:p>
         </p:txBody>
@@ -5142,7 +5358,242 @@
 </p:sld>
 </file>
 
-<file path=ppt/slides/slide15.xml><?xml version="1.0" encoding="utf-8"?>
+<file path=ppt/slides/slide16.xml><?xml version="1.0" encoding="utf-8"?>
+<p:sld xmlns:a="http://schemas.openxmlformats.org/drawingml/2006/main" xmlns:r="http://schemas.openxmlformats.org/officeDocument/2006/relationships" xmlns:p="http://schemas.openxmlformats.org/presentationml/2006/main">
+  <p:cSld>
+    <p:bg>
+      <p:bgPr>
+        <a:solidFill>
+          <a:schemeClr val="accent2"/>
+        </a:solidFill>
+        <a:effectLst/>
+      </p:bgPr>
+    </p:bg>
+    <p:spTree>
+      <p:nvGrpSpPr>
+        <p:cNvPr id="1" name=""/>
+        <p:cNvGrpSpPr/>
+        <p:nvPr/>
+      </p:nvGrpSpPr>
+      <p:grpSpPr>
+        <a:xfrm>
+          <a:off x="0" y="0"/>
+          <a:ext cx="0" cy="0"/>
+          <a:chOff x="0" y="0"/>
+          <a:chExt cx="0" cy="0"/>
+        </a:xfrm>
+      </p:grpSpPr>
+      <p:sp>
+        <p:nvSpPr>
+          <p:cNvPr id="2" name="Title 1">
+            <a:extLst>
+              <a:ext uri="{FF2B5EF4-FFF2-40B4-BE49-F238E27FC236}">
+                <a16:creationId xmlns:a16="http://schemas.microsoft.com/office/drawing/2014/main" id="{571081C1-DB74-AC40-AD1F-DEFAB791DF8A}"/>
+              </a:ext>
+            </a:extLst>
+          </p:cNvPr>
+          <p:cNvSpPr>
+            <a:spLocks noGrp="1"/>
+          </p:cNvSpPr>
+          <p:nvPr>
+            <p:ph type="title"/>
+          </p:nvPr>
+        </p:nvSpPr>
+        <p:spPr>
+          <a:xfrm>
+            <a:off x="5458970" y="2386744"/>
+            <a:ext cx="5928358" cy="1645920"/>
+          </a:xfrm>
+        </p:spPr>
+        <p:txBody>
+          <a:bodyPr vert="horz" lIns="274320" tIns="182880" rIns="274320" bIns="182880" rtlCol="0" anchor="ctr" anchorCtr="1">
+            <a:normAutofit/>
+          </a:bodyPr>
+          <a:lstStyle/>
+          <a:p>
+            <a:r>
+              <a:rPr lang="en-US" sz="3800" dirty="0"/>
+              <a:t> </a:t>
+            </a:r>
+          </a:p>
+        </p:txBody>
+      </p:sp>
+      <p:sp>
+        <p:nvSpPr>
+          <p:cNvPr id="20" name="Rectangle 19">
+            <a:extLst>
+              <a:ext uri="{FF2B5EF4-FFF2-40B4-BE49-F238E27FC236}">
+                <a16:creationId xmlns:a16="http://schemas.microsoft.com/office/drawing/2014/main" id="{5DDB0576-F160-45D9-9E44-E87FAC5E0E15}"/>
+              </a:ext>
+              <a:ext uri="{C183D7F6-B498-43B3-948B-1728B52AA6E4}">
+                <adec:decorative xmlns:adec="http://schemas.microsoft.com/office/drawing/2017/decorative" val="1"/>
+              </a:ext>
+            </a:extLst>
+          </p:cNvPr>
+          <p:cNvSpPr>
+            <a:spLocks noGrp="1" noRot="1" noChangeAspect="1" noMove="1" noResize="1" noEditPoints="1" noAdjustHandles="1" noChangeArrowheads="1" noChangeShapeType="1" noTextEdit="1"/>
+          </p:cNvSpPr>
+          <p:nvPr>
+            <p:extLst>
+              <p:ext uri="{386F3935-93C4-4BCD-93E2-E3B085C9AB24}">
+                <p16:designElem xmlns:p16="http://schemas.microsoft.com/office/powerpoint/2015/main" val="1"/>
+              </p:ext>
+            </p:extLst>
+          </p:nvPr>
+        </p:nvSpPr>
+        <p:spPr>
+          <a:xfrm>
+            <a:off x="-19155" y="0"/>
+            <a:ext cx="4654297" cy="6858000"/>
+          </a:xfrm>
+          <a:prstGeom prst="rect">
+            <a:avLst/>
+          </a:prstGeom>
+          <a:solidFill>
+            <a:srgbClr val="FFFFFF"/>
+          </a:solidFill>
+          <a:ln>
+            <a:noFill/>
+          </a:ln>
+        </p:spPr>
+        <p:style>
+          <a:lnRef idx="2">
+            <a:schemeClr val="accent1">
+              <a:shade val="50000"/>
+            </a:schemeClr>
+          </a:lnRef>
+          <a:fillRef idx="1">
+            <a:schemeClr val="accent1"/>
+          </a:fillRef>
+          <a:effectRef idx="0">
+            <a:schemeClr val="accent1"/>
+          </a:effectRef>
+          <a:fontRef idx="minor">
+            <a:schemeClr val="lt1"/>
+          </a:fontRef>
+        </p:style>
+        <p:txBody>
+          <a:bodyPr rtlCol="0" anchor="ctr"/>
+          <a:lstStyle/>
+          <a:p>
+            <a:pPr algn="ctr"/>
+            <a:endParaRPr lang="en-US"/>
+          </a:p>
+        </p:txBody>
+      </p:sp>
+      <p:pic>
+        <p:nvPicPr>
+          <p:cNvPr id="12" name="Picture 11">
+            <a:extLst>
+              <a:ext uri="{FF2B5EF4-FFF2-40B4-BE49-F238E27FC236}">
+                <a16:creationId xmlns:a16="http://schemas.microsoft.com/office/drawing/2014/main" id="{EBE5B386-11F8-9949-ADEC-610989824778}"/>
+              </a:ext>
+            </a:extLst>
+          </p:cNvPr>
+          <p:cNvPicPr>
+            <a:picLocks noChangeAspect="1"/>
+          </p:cNvPicPr>
+          <p:nvPr/>
+        </p:nvPicPr>
+        <p:blipFill>
+          <a:blip r:embed="rId2"/>
+          <a:stretch>
+            <a:fillRect/>
+          </a:stretch>
+        </p:blipFill>
+        <p:spPr>
+          <a:xfrm>
+            <a:off x="6736080" y="2928526"/>
+            <a:ext cx="3374137" cy="562356"/>
+          </a:xfrm>
+          <a:prstGeom prst="rect">
+            <a:avLst/>
+          </a:prstGeom>
+        </p:spPr>
+      </p:pic>
+      <p:sp>
+        <p:nvSpPr>
+          <p:cNvPr id="21" name="TextBox 20">
+            <a:extLst>
+              <a:ext uri="{FF2B5EF4-FFF2-40B4-BE49-F238E27FC236}">
+                <a16:creationId xmlns:a16="http://schemas.microsoft.com/office/drawing/2014/main" id="{CC192B2D-ACA1-FF42-B949-5E39728E46B2}"/>
+              </a:ext>
+            </a:extLst>
+          </p:cNvPr>
+          <p:cNvSpPr txBox="1"/>
+          <p:nvPr/>
+        </p:nvSpPr>
+        <p:spPr>
+          <a:xfrm>
+            <a:off x="6362648" y="4175241"/>
+            <a:ext cx="4121000" cy="523220"/>
+          </a:xfrm>
+          <a:prstGeom prst="rect">
+            <a:avLst/>
+          </a:prstGeom>
+          <a:noFill/>
+        </p:spPr>
+        <p:txBody>
+          <a:bodyPr wrap="none" rtlCol="0">
+            <a:spAutoFit/>
+          </a:bodyPr>
+          <a:lstStyle/>
+          <a:p>
+            <a:r>
+              <a:rPr lang="en-US" sz="2800" dirty="0">
+                <a:solidFill>
+                  <a:schemeClr val="bg1"/>
+                </a:solidFill>
+              </a:rPr>
+              <a:t>Calling all talents onboard..</a:t>
+            </a:r>
+          </a:p>
+        </p:txBody>
+      </p:sp>
+      <p:pic>
+        <p:nvPicPr>
+          <p:cNvPr id="23" name="Picture 22">
+            <a:extLst>
+              <a:ext uri="{FF2B5EF4-FFF2-40B4-BE49-F238E27FC236}">
+                <a16:creationId xmlns:a16="http://schemas.microsoft.com/office/drawing/2014/main" id="{D261A095-9915-464C-8E04-E37A9670506A}"/>
+              </a:ext>
+            </a:extLst>
+          </p:cNvPr>
+          <p:cNvPicPr>
+            <a:picLocks noChangeAspect="1"/>
+          </p:cNvPicPr>
+          <p:nvPr/>
+        </p:nvPicPr>
+        <p:blipFill>
+          <a:blip r:embed="rId3"/>
+          <a:stretch>
+            <a:fillRect/>
+          </a:stretch>
+        </p:blipFill>
+        <p:spPr>
+          <a:xfrm>
+            <a:off x="284206" y="887667"/>
+            <a:ext cx="4004946" cy="5206430"/>
+          </a:xfrm>
+          <a:prstGeom prst="rect">
+            <a:avLst/>
+          </a:prstGeom>
+        </p:spPr>
+      </p:pic>
+    </p:spTree>
+    <p:extLst>
+      <p:ext uri="{BB962C8B-B14F-4D97-AF65-F5344CB8AC3E}">
+        <p14:creationId xmlns:p14="http://schemas.microsoft.com/office/powerpoint/2010/main" val="2791066900"/>
+      </p:ext>
+    </p:extLst>
+  </p:cSld>
+  <p:clrMapOvr>
+    <a:masterClrMapping/>
+  </p:clrMapOvr>
+</p:sld>
+</file>
+
+<file path=ppt/slides/slide17.xml><?xml version="1.0" encoding="utf-8"?>
 <p:sld xmlns:a="http://schemas.openxmlformats.org/drawingml/2006/main" xmlns:r="http://schemas.openxmlformats.org/officeDocument/2006/relationships" xmlns:p="http://schemas.openxmlformats.org/presentationml/2006/main">
   <p:cSld>
     <p:bg>
@@ -5486,147 +5937,12 @@
 <file path=ppt/slides/slide3.xml><?xml version="1.0" encoding="utf-8"?>
 <p:sld xmlns:a="http://schemas.openxmlformats.org/drawingml/2006/main" xmlns:r="http://schemas.openxmlformats.org/officeDocument/2006/relationships" xmlns:p="http://schemas.openxmlformats.org/presentationml/2006/main">
   <p:cSld>
-    <p:spTree>
-      <p:nvGrpSpPr>
-        <p:cNvPr id="1" name=""/>
-        <p:cNvGrpSpPr/>
-        <p:nvPr/>
-      </p:nvGrpSpPr>
-      <p:grpSpPr>
-        <a:xfrm>
-          <a:off x="0" y="0"/>
-          <a:ext cx="0" cy="0"/>
-          <a:chOff x="0" y="0"/>
-          <a:chExt cx="0" cy="0"/>
-        </a:xfrm>
-      </p:grpSpPr>
-      <p:sp>
-        <p:nvSpPr>
-          <p:cNvPr id="2" name="Title 1">
-            <a:extLst>
-              <a:ext uri="{FF2B5EF4-FFF2-40B4-BE49-F238E27FC236}">
-                <a16:creationId xmlns:a16="http://schemas.microsoft.com/office/drawing/2014/main" id="{CF8A5039-DFAA-6641-8523-8B4A00750F69}"/>
-              </a:ext>
-            </a:extLst>
-          </p:cNvPr>
-          <p:cNvSpPr>
-            <a:spLocks noGrp="1"/>
-          </p:cNvSpPr>
-          <p:nvPr>
-            <p:ph type="title"/>
-          </p:nvPr>
-        </p:nvSpPr>
-        <p:spPr/>
-        <p:txBody>
-          <a:bodyPr/>
-          <a:lstStyle/>
-          <a:p>
-            <a:r>
-              <a:rPr lang="en-US" dirty="0"/>
-              <a:t>Lets set our Expectations</a:t>
-            </a:r>
-          </a:p>
-        </p:txBody>
-      </p:sp>
-      <p:sp>
-        <p:nvSpPr>
-          <p:cNvPr id="3" name="Content Placeholder 2">
-            <a:extLst>
-              <a:ext uri="{FF2B5EF4-FFF2-40B4-BE49-F238E27FC236}">
-                <a16:creationId xmlns:a16="http://schemas.microsoft.com/office/drawing/2014/main" id="{014C989A-A0C4-A547-BA05-DF97C8CA59E0}"/>
-              </a:ext>
-            </a:extLst>
-          </p:cNvPr>
-          <p:cNvSpPr>
-            <a:spLocks noGrp="1"/>
-          </p:cNvSpPr>
-          <p:nvPr>
-            <p:ph idx="1"/>
-          </p:nvPr>
-        </p:nvSpPr>
-        <p:spPr/>
-        <p:txBody>
-          <a:bodyPr/>
-          <a:lstStyle/>
-          <a:p>
-            <a:pPr marL="0" indent="0">
-              <a:buNone/>
-            </a:pPr>
-            <a:r>
-              <a:rPr lang="en-US" dirty="0"/>
-              <a:t>Before we begin, lets set our expectations in working with the DB:</a:t>
-            </a:r>
-          </a:p>
-          <a:p>
-            <a:r>
-              <a:rPr lang="en-US" dirty="0"/>
-              <a:t>We would like to use Composite Primary Key</a:t>
-            </a:r>
-          </a:p>
-          <a:p>
-            <a:r>
-              <a:rPr lang="en-US" dirty="0"/>
-              <a:t>The raw queries should be understandable and optimizable</a:t>
-            </a:r>
-          </a:p>
-          <a:p>
-            <a:r>
-              <a:rPr lang="en-US" dirty="0"/>
-              <a:t>Migrations should not be linked to our app’s code by any way (i.e. using models in the migrations or linking business logic to a migration)</a:t>
-            </a:r>
-          </a:p>
-          <a:p>
-            <a:r>
-              <a:rPr lang="en-US" dirty="0"/>
-              <a:t>We would like to use all of our </a:t>
-            </a:r>
-            <a:r>
-              <a:rPr lang="en-US" dirty="0" err="1"/>
-              <a:t>db</a:t>
-            </a:r>
-            <a:r>
-              <a:rPr lang="en-US" dirty="0"/>
-              <a:t> features (i.e. in Postgres – </a:t>
-            </a:r>
-            <a:r>
-              <a:rPr lang="en-US" dirty="0" err="1"/>
-              <a:t>Enum</a:t>
-            </a:r>
-            <a:r>
-              <a:rPr lang="en-US" dirty="0"/>
-              <a:t> data type, JSONB type, using all of JOIN types, using vector search text </a:t>
-            </a:r>
-            <a:r>
-              <a:rPr lang="en-US" dirty="0" err="1"/>
-              <a:t>etc</a:t>
-            </a:r>
-            <a:r>
-              <a:rPr lang="en-US" dirty="0"/>
-              <a:t>)</a:t>
-            </a:r>
-          </a:p>
-        </p:txBody>
-      </p:sp>
-    </p:spTree>
-    <p:extLst>
-      <p:ext uri="{BB962C8B-B14F-4D97-AF65-F5344CB8AC3E}">
-        <p14:creationId xmlns:p14="http://schemas.microsoft.com/office/powerpoint/2010/main" val="2445972989"/>
-      </p:ext>
-    </p:extLst>
-  </p:cSld>
-  <p:clrMapOvr>
-    <a:masterClrMapping/>
-  </p:clrMapOvr>
-</p:sld>
-</file>
-
-<file path=ppt/slides/slide4.xml><?xml version="1.0" encoding="utf-8"?>
-<p:sld xmlns:a="http://schemas.openxmlformats.org/drawingml/2006/main" xmlns:r="http://schemas.openxmlformats.org/officeDocument/2006/relationships" xmlns:p="http://schemas.openxmlformats.org/presentationml/2006/main">
-  <p:cSld>
     <p:bg>
       <p:bgPr>
         <a:solidFill>
-          <a:schemeClr val="accent2"/>
+          <a:schemeClr val="bg1">
+            <a:lumMod val="95000"/>
+          </a:schemeClr>
         </a:solidFill>
         <a:effectLst/>
       </p:bgPr>
@@ -5647,75 +5963,294 @@
       </p:grpSpPr>
       <p:sp>
         <p:nvSpPr>
-          <p:cNvPr id="7" name="Rectangle 6">
+          <p:cNvPr id="2" name="Title 1">
             <a:extLst>
               <a:ext uri="{FF2B5EF4-FFF2-40B4-BE49-F238E27FC236}">
-                <a16:creationId xmlns:a16="http://schemas.microsoft.com/office/drawing/2014/main" id="{87D3A4E0-C908-4EA9-ABDF-E82AD6BDEF9D}"/>
-              </a:ext>
-              <a:ext uri="{C183D7F6-B498-43B3-948B-1728B52AA6E4}">
-                <adec:decorative xmlns:adec="http://schemas.microsoft.com/office/drawing/2017/decorative" val="1"/>
+                <a16:creationId xmlns:a16="http://schemas.microsoft.com/office/drawing/2014/main" id="{E792511F-CEB8-7041-966C-AE77F40B6A47}"/>
               </a:ext>
             </a:extLst>
           </p:cNvPr>
           <p:cNvSpPr>
-            <a:spLocks noGrp="1" noRot="1" noChangeAspect="1" noMove="1" noResize="1" noEditPoints="1" noAdjustHandles="1" noChangeArrowheads="1" noChangeShapeType="1" noTextEdit="1"/>
-          </p:cNvSpPr>
-          <p:nvPr>
-            <p:extLst>
-              <p:ext uri="{386F3935-93C4-4BCD-93E2-E3B085C9AB24}">
-                <p16:designElem xmlns:p16="http://schemas.microsoft.com/office/powerpoint/2015/main" val="1"/>
-              </p:ext>
-            </p:extLst>
+            <a:spLocks noGrp="1"/>
+          </p:cNvSpPr>
+          <p:nvPr>
+            <p:ph type="title"/>
           </p:nvPr>
         </p:nvSpPr>
         <p:spPr>
           <a:xfrm>
-            <a:off x="6096000" y="0"/>
-            <a:ext cx="6096000" cy="6858000"/>
+            <a:off x="2231136" y="964692"/>
+            <a:ext cx="7729728" cy="1188720"/>
+          </a:xfrm>
+        </p:spPr>
+        <p:txBody>
+          <a:bodyPr>
+            <a:normAutofit/>
+          </a:bodyPr>
+          <a:lstStyle/>
+          <a:p>
+            <a:r>
+              <a:rPr lang="en-US" dirty="0"/>
+              <a:t>ORMs – the good side</a:t>
+            </a:r>
+          </a:p>
+        </p:txBody>
+      </p:sp>
+      <p:sp>
+        <p:nvSpPr>
+          <p:cNvPr id="6" name="TextBox 5">
+            <a:extLst>
+              <a:ext uri="{FF2B5EF4-FFF2-40B4-BE49-F238E27FC236}">
+                <a16:creationId xmlns:a16="http://schemas.microsoft.com/office/drawing/2014/main" id="{C21AF48F-2152-D148-87BA-6CF8FD07403C}"/>
+              </a:ext>
+            </a:extLst>
+          </p:cNvPr>
+          <p:cNvSpPr txBox="1"/>
+          <p:nvPr/>
+        </p:nvSpPr>
+        <p:spPr>
+          <a:xfrm>
+            <a:off x="464811" y="2580930"/>
+            <a:ext cx="5631189" cy="3970318"/>
           </a:xfrm>
           <a:prstGeom prst="rect">
             <a:avLst/>
           </a:prstGeom>
-          <a:solidFill>
-            <a:schemeClr val="tx1">
-              <a:lumMod val="95000"/>
-            </a:schemeClr>
-          </a:solidFill>
-          <a:ln>
-            <a:noFill/>
-          </a:ln>
+          <a:noFill/>
         </p:spPr>
-        <p:style>
-          <a:lnRef idx="2">
-            <a:schemeClr val="accent1">
-              <a:shade val="50000"/>
-            </a:schemeClr>
-          </a:lnRef>
-          <a:fillRef idx="1">
-            <a:schemeClr val="accent1"/>
-          </a:fillRef>
-          <a:effectRef idx="0">
-            <a:schemeClr val="accent1"/>
-          </a:effectRef>
-          <a:fontRef idx="minor">
-            <a:schemeClr val="lt1"/>
-          </a:fontRef>
-        </p:style>
-        <p:txBody>
-          <a:bodyPr rtlCol="0" anchor="ctr"/>
-          <a:lstStyle/>
-          <a:p>
-            <a:pPr algn="ctr"/>
-            <a:endParaRPr lang="en-US"/>
-          </a:p>
-        </p:txBody>
-      </p:sp>
+        <p:txBody>
+          <a:bodyPr wrap="square" rtlCol="0">
+            <a:spAutoFit/>
+          </a:bodyPr>
+          <a:lstStyle/>
+          <a:p>
+            <a:r>
+              <a:rPr lang="en-US" b="1" dirty="0"/>
+              <a:t>Saves time:</a:t>
+            </a:r>
+          </a:p>
+          <a:p>
+            <a:endParaRPr lang="en-US" dirty="0"/>
+          </a:p>
+          <a:p>
+            <a:pPr marL="285750" indent="-285750">
+              <a:buFont typeface="Arial" panose="020B0604020202020204" pitchFamily="34" charset="0"/>
+              <a:buChar char="•"/>
+            </a:pPr>
+            <a:r>
+              <a:rPr lang="en-US" u="sng" dirty="0"/>
+              <a:t>Easier to maintain</a:t>
+            </a:r>
+            <a:r>
+              <a:rPr lang="en-US" dirty="0"/>
+              <a:t> – because all </a:t>
+            </a:r>
+            <a:r>
+              <a:rPr lang="en-US" dirty="0" err="1"/>
+              <a:t>db</a:t>
+            </a:r>
+            <a:r>
+              <a:rPr lang="en-US" dirty="0"/>
+              <a:t> interactions are written in the same place, in the same language</a:t>
+            </a:r>
+            <a:br>
+              <a:rPr lang="en-US" dirty="0"/>
+            </a:br>
+            <a:endParaRPr lang="en-US" dirty="0"/>
+          </a:p>
+          <a:p>
+            <a:pPr marL="285750" indent="-285750">
+              <a:buFont typeface="Arial" panose="020B0604020202020204" pitchFamily="34" charset="0"/>
+              <a:buChar char="•"/>
+            </a:pPr>
+            <a:r>
+              <a:rPr lang="en-US" u="sng" dirty="0"/>
+              <a:t>Automated workflow</a:t>
+            </a:r>
+            <a:r>
+              <a:rPr lang="en-US" dirty="0"/>
+              <a:t> – events, transactions </a:t>
+            </a:r>
+            <a:r>
+              <a:rPr lang="en-US" dirty="0" err="1"/>
+              <a:t>etc</a:t>
+            </a:r>
+            <a:br>
+              <a:rPr lang="en-US" dirty="0"/>
+            </a:br>
+            <a:endParaRPr lang="en-US" dirty="0"/>
+          </a:p>
+          <a:p>
+            <a:pPr marL="285750" indent="-285750">
+              <a:buFont typeface="Arial" panose="020B0604020202020204" pitchFamily="34" charset="0"/>
+              <a:buChar char="•"/>
+            </a:pPr>
+            <a:r>
+              <a:rPr lang="en-US" u="sng" dirty="0"/>
+              <a:t>MVC Code</a:t>
+            </a:r>
+            <a:r>
+              <a:rPr lang="en-US" dirty="0"/>
+              <a:t> - In most cases, it forces you to write MVC code, which, in the end, makes your code a little cleaner.</a:t>
+            </a:r>
+            <a:br>
+              <a:rPr lang="en-US" dirty="0"/>
+            </a:br>
+            <a:endParaRPr lang="en-US" dirty="0"/>
+          </a:p>
+          <a:p>
+            <a:pPr marL="285750" indent="-285750">
+              <a:buFont typeface="Arial" panose="020B0604020202020204" pitchFamily="34" charset="0"/>
+              <a:buChar char="•"/>
+            </a:pPr>
+            <a:r>
+              <a:rPr lang="en-US" u="sng" dirty="0"/>
+              <a:t>You don't have to write poorly-formed SQL </a:t>
+            </a:r>
+            <a:r>
+              <a:rPr lang="en-US" dirty="0"/>
+              <a:t> - most people are very afraid of writing down SQL queries because SQL is treated as a “sub-language”</a:t>
+            </a:r>
+          </a:p>
+        </p:txBody>
+      </p:sp>
+      <p:sp>
+        <p:nvSpPr>
+          <p:cNvPr id="7" name="TextBox 6">
+            <a:extLst>
+              <a:ext uri="{FF2B5EF4-FFF2-40B4-BE49-F238E27FC236}">
+                <a16:creationId xmlns:a16="http://schemas.microsoft.com/office/drawing/2014/main" id="{F5D4A19D-242E-834B-99B8-2A334256658C}"/>
+              </a:ext>
+            </a:extLst>
+          </p:cNvPr>
+          <p:cNvSpPr txBox="1"/>
+          <p:nvPr/>
+        </p:nvSpPr>
+        <p:spPr>
+          <a:xfrm>
+            <a:off x="6293081" y="2580930"/>
+            <a:ext cx="5631189" cy="2862322"/>
+          </a:xfrm>
+          <a:prstGeom prst="rect">
+            <a:avLst/>
+          </a:prstGeom>
+          <a:noFill/>
+        </p:spPr>
+        <p:txBody>
+          <a:bodyPr wrap="square" rtlCol="0">
+            <a:spAutoFit/>
+          </a:bodyPr>
+          <a:lstStyle/>
+          <a:p>
+            <a:r>
+              <a:rPr lang="en-US" b="1" dirty="0"/>
+              <a:t>Abstraction:</a:t>
+            </a:r>
+          </a:p>
+          <a:p>
+            <a:endParaRPr lang="en-US" dirty="0"/>
+          </a:p>
+          <a:p>
+            <a:pPr marL="285750" indent="-285750">
+              <a:buFont typeface="Arial" panose="020B0604020202020204" pitchFamily="34" charset="0"/>
+              <a:buChar char="•"/>
+            </a:pPr>
+            <a:r>
+              <a:rPr lang="en-US" u="sng" dirty="0"/>
+              <a:t>Your language</a:t>
+            </a:r>
+            <a:r>
+              <a:rPr lang="en-US" dirty="0"/>
+              <a:t>: it fits in your natural way of coding.</a:t>
+            </a:r>
+            <a:br>
+              <a:rPr lang="en-US" dirty="0"/>
+            </a:br>
+            <a:endParaRPr lang="en-US" dirty="0"/>
+          </a:p>
+          <a:p>
+            <a:pPr marL="285750" indent="-285750">
+              <a:buFont typeface="Arial" panose="020B0604020202020204" pitchFamily="34" charset="0"/>
+              <a:buChar char="•"/>
+            </a:pPr>
+            <a:r>
+              <a:rPr lang="en-US" u="sng" dirty="0"/>
+              <a:t>DB Agnostic</a:t>
+            </a:r>
+            <a:r>
+              <a:rPr lang="en-US" dirty="0"/>
+              <a:t> – lets you write your queries in higher level so that if you choose another </a:t>
+            </a:r>
+            <a:r>
+              <a:rPr lang="en-US" dirty="0" err="1"/>
+              <a:t>db</a:t>
+            </a:r>
+            <a:r>
+              <a:rPr lang="en-US" dirty="0"/>
+              <a:t>, in theory it’ll be much easier to move</a:t>
+            </a:r>
+            <a:br>
+              <a:rPr lang="en-US" dirty="0"/>
+            </a:br>
+            <a:endParaRPr lang="en-US" dirty="0"/>
+          </a:p>
+          <a:p>
+            <a:pPr marL="285750" indent="-285750">
+              <a:buFont typeface="Arial" panose="020B0604020202020204" pitchFamily="34" charset="0"/>
+              <a:buChar char="•"/>
+            </a:pPr>
+            <a:r>
+              <a:rPr lang="en-US" u="sng" dirty="0" err="1"/>
+              <a:t>Resuage</a:t>
+            </a:r>
+            <a:r>
+              <a:rPr lang="en-US" dirty="0"/>
+              <a:t> – you can reuse things between models, such as creation date </a:t>
+            </a:r>
+            <a:r>
+              <a:rPr lang="en-US" dirty="0" err="1"/>
+              <a:t>etc</a:t>
+            </a:r>
+            <a:endParaRPr lang="en-US" dirty="0"/>
+          </a:p>
+        </p:txBody>
+      </p:sp>
+    </p:spTree>
+    <p:extLst>
+      <p:ext uri="{BB962C8B-B14F-4D97-AF65-F5344CB8AC3E}">
+        <p14:creationId xmlns:p14="http://schemas.microsoft.com/office/powerpoint/2010/main" val="323324953"/>
+      </p:ext>
+    </p:extLst>
+  </p:cSld>
+  <p:clrMapOvr>
+    <a:masterClrMapping/>
+  </p:clrMapOvr>
+</p:sld>
+</file>
+
+<file path=ppt/slides/slide4.xml><?xml version="1.0" encoding="utf-8"?>
+<p:sld xmlns:a="http://schemas.openxmlformats.org/drawingml/2006/main" xmlns:r="http://schemas.openxmlformats.org/officeDocument/2006/relationships" xmlns:p="http://schemas.openxmlformats.org/presentationml/2006/main">
+  <p:cSld>
+    <p:spTree>
+      <p:nvGrpSpPr>
+        <p:cNvPr id="1" name=""/>
+        <p:cNvGrpSpPr/>
+        <p:nvPr/>
+      </p:nvGrpSpPr>
+      <p:grpSpPr>
+        <a:xfrm>
+          <a:off x="0" y="0"/>
+          <a:ext cx="0" cy="0"/>
+          <a:chOff x="0" y="0"/>
+          <a:chExt cx="0" cy="0"/>
+        </a:xfrm>
+      </p:grpSpPr>
       <p:sp>
         <p:nvSpPr>
           <p:cNvPr id="2" name="Title 1">
             <a:extLst>
               <a:ext uri="{FF2B5EF4-FFF2-40B4-BE49-F238E27FC236}">
-                <a16:creationId xmlns:a16="http://schemas.microsoft.com/office/drawing/2014/main" id="{AB26D0E2-DEC7-EF48-885A-89592D2B94DF}"/>
+                <a16:creationId xmlns:a16="http://schemas.microsoft.com/office/drawing/2014/main" id="{CF8A5039-DFAA-6641-8523-8B4A00750F69}"/>
               </a:ext>
             </a:extLst>
           </p:cNvPr>
@@ -5726,28 +6261,93 @@
             <p:ph type="title"/>
           </p:nvPr>
         </p:nvSpPr>
-        <p:spPr>
-          <a:xfrm>
-            <a:off x="1600200" y="2363323"/>
-            <a:ext cx="8991600" cy="1692771"/>
-          </a:xfrm>
-        </p:spPr>
-        <p:txBody>
-          <a:bodyPr vert="horz" lIns="274320" tIns="182880" rIns="274320" bIns="182880" rtlCol="0" anchor="ctr" anchorCtr="1">
-            <a:normAutofit/>
-          </a:bodyPr>
-          <a:lstStyle/>
-          <a:p>
-            <a:r>
-              <a:rPr lang="en-US" sz="3800" kern="1200" cap="all" spc="200" baseline="0" dirty="0">
-                <a:solidFill>
-                  <a:srgbClr val="262626"/>
-                </a:solidFill>
-                <a:latin typeface="+mj-lt"/>
-                <a:ea typeface="+mj-ea"/>
-                <a:cs typeface="+mj-cs"/>
-              </a:rPr>
-              <a:t>Layers of abstraction</a:t>
+        <p:spPr/>
+        <p:txBody>
+          <a:bodyPr/>
+          <a:lstStyle/>
+          <a:p>
+            <a:r>
+              <a:rPr lang="en-US" dirty="0"/>
+              <a:t>Lets set our Expectations</a:t>
+            </a:r>
+          </a:p>
+        </p:txBody>
+      </p:sp>
+      <p:sp>
+        <p:nvSpPr>
+          <p:cNvPr id="3" name="Content Placeholder 2">
+            <a:extLst>
+              <a:ext uri="{FF2B5EF4-FFF2-40B4-BE49-F238E27FC236}">
+                <a16:creationId xmlns:a16="http://schemas.microsoft.com/office/drawing/2014/main" id="{014C989A-A0C4-A547-BA05-DF97C8CA59E0}"/>
+              </a:ext>
+            </a:extLst>
+          </p:cNvPr>
+          <p:cNvSpPr>
+            <a:spLocks noGrp="1"/>
+          </p:cNvSpPr>
+          <p:nvPr>
+            <p:ph idx="1"/>
+          </p:nvPr>
+        </p:nvSpPr>
+        <p:spPr/>
+        <p:txBody>
+          <a:bodyPr/>
+          <a:lstStyle/>
+          <a:p>
+            <a:pPr marL="0" indent="0">
+              <a:buNone/>
+            </a:pPr>
+            <a:r>
+              <a:rPr lang="en-US" dirty="0"/>
+              <a:t>Before we begin, lets set our expectations in working with the DB:</a:t>
+            </a:r>
+          </a:p>
+          <a:p>
+            <a:r>
+              <a:rPr lang="en-US" dirty="0"/>
+              <a:t>We would like to use Composite Primary Key</a:t>
+            </a:r>
+          </a:p>
+          <a:p>
+            <a:r>
+              <a:rPr lang="en-US" dirty="0"/>
+              <a:t>The raw queries should be understandable and optimizable</a:t>
+            </a:r>
+          </a:p>
+          <a:p>
+            <a:r>
+              <a:rPr lang="en-US" dirty="0"/>
+              <a:t>Migrations should not be linked to our app’s code by any way (i.e. using models in the migrations or linking business logic to a migration)</a:t>
+            </a:r>
+          </a:p>
+          <a:p>
+            <a:r>
+              <a:rPr lang="en-US" dirty="0"/>
+              <a:t>We would like to use all of our </a:t>
+            </a:r>
+            <a:r>
+              <a:rPr lang="en-US" dirty="0" err="1"/>
+              <a:t>db</a:t>
+            </a:r>
+            <a:r>
+              <a:rPr lang="en-US" dirty="0"/>
+              <a:t> features (i.e. in Postgres – </a:t>
+            </a:r>
+            <a:r>
+              <a:rPr lang="en-US" dirty="0" err="1"/>
+              <a:t>Enum</a:t>
+            </a:r>
+            <a:r>
+              <a:rPr lang="en-US" dirty="0"/>
+              <a:t> data type, JSONB type, using all of JOIN types, using vector search text </a:t>
+            </a:r>
+            <a:r>
+              <a:rPr lang="en-US" dirty="0" err="1"/>
+              <a:t>etc</a:t>
+            </a:r>
+            <a:r>
+              <a:rPr lang="en-US" dirty="0"/>
+              <a:t>)</a:t>
             </a:r>
           </a:p>
         </p:txBody>
@@ -5755,7 +6355,7 @@
     </p:spTree>
     <p:extLst>
       <p:ext uri="{BB962C8B-B14F-4D97-AF65-F5344CB8AC3E}">
-        <p14:creationId xmlns:p14="http://schemas.microsoft.com/office/powerpoint/2010/main" val="2976599677"/>
+        <p14:creationId xmlns:p14="http://schemas.microsoft.com/office/powerpoint/2010/main" val="2445972989"/>
       </p:ext>
     </p:extLst>
   </p:cSld>
@@ -5792,6 +6392,151 @@
       </p:grpSpPr>
       <p:sp>
         <p:nvSpPr>
+          <p:cNvPr id="7" name="Rectangle 6">
+            <a:extLst>
+              <a:ext uri="{FF2B5EF4-FFF2-40B4-BE49-F238E27FC236}">
+                <a16:creationId xmlns:a16="http://schemas.microsoft.com/office/drawing/2014/main" id="{87D3A4E0-C908-4EA9-ABDF-E82AD6BDEF9D}"/>
+              </a:ext>
+              <a:ext uri="{C183D7F6-B498-43B3-948B-1728B52AA6E4}">
+                <adec:decorative xmlns:adec="http://schemas.microsoft.com/office/drawing/2017/decorative" val="1"/>
+              </a:ext>
+            </a:extLst>
+          </p:cNvPr>
+          <p:cNvSpPr>
+            <a:spLocks noGrp="1" noRot="1" noChangeAspect="1" noMove="1" noResize="1" noEditPoints="1" noAdjustHandles="1" noChangeArrowheads="1" noChangeShapeType="1" noTextEdit="1"/>
+          </p:cNvSpPr>
+          <p:nvPr>
+            <p:extLst>
+              <p:ext uri="{386F3935-93C4-4BCD-93E2-E3B085C9AB24}">
+                <p16:designElem xmlns:p16="http://schemas.microsoft.com/office/powerpoint/2015/main" val="1"/>
+              </p:ext>
+            </p:extLst>
+          </p:nvPr>
+        </p:nvSpPr>
+        <p:spPr>
+          <a:xfrm>
+            <a:off x="6096000" y="0"/>
+            <a:ext cx="6096000" cy="6858000"/>
+          </a:xfrm>
+          <a:prstGeom prst="rect">
+            <a:avLst/>
+          </a:prstGeom>
+          <a:solidFill>
+            <a:schemeClr val="tx1">
+              <a:lumMod val="95000"/>
+            </a:schemeClr>
+          </a:solidFill>
+          <a:ln>
+            <a:noFill/>
+          </a:ln>
+        </p:spPr>
+        <p:style>
+          <a:lnRef idx="2">
+            <a:schemeClr val="accent1">
+              <a:shade val="50000"/>
+            </a:schemeClr>
+          </a:lnRef>
+          <a:fillRef idx="1">
+            <a:schemeClr val="accent1"/>
+          </a:fillRef>
+          <a:effectRef idx="0">
+            <a:schemeClr val="accent1"/>
+          </a:effectRef>
+          <a:fontRef idx="minor">
+            <a:schemeClr val="lt1"/>
+          </a:fontRef>
+        </p:style>
+        <p:txBody>
+          <a:bodyPr rtlCol="0" anchor="ctr"/>
+          <a:lstStyle/>
+          <a:p>
+            <a:pPr algn="ctr"/>
+            <a:endParaRPr lang="en-US"/>
+          </a:p>
+        </p:txBody>
+      </p:sp>
+      <p:sp>
+        <p:nvSpPr>
+          <p:cNvPr id="2" name="Title 1">
+            <a:extLst>
+              <a:ext uri="{FF2B5EF4-FFF2-40B4-BE49-F238E27FC236}">
+                <a16:creationId xmlns:a16="http://schemas.microsoft.com/office/drawing/2014/main" id="{AB26D0E2-DEC7-EF48-885A-89592D2B94DF}"/>
+              </a:ext>
+            </a:extLst>
+          </p:cNvPr>
+          <p:cNvSpPr>
+            <a:spLocks noGrp="1"/>
+          </p:cNvSpPr>
+          <p:nvPr>
+            <p:ph type="title"/>
+          </p:nvPr>
+        </p:nvSpPr>
+        <p:spPr>
+          <a:xfrm>
+            <a:off x="1600200" y="2363323"/>
+            <a:ext cx="8991600" cy="1692771"/>
+          </a:xfrm>
+        </p:spPr>
+        <p:txBody>
+          <a:bodyPr vert="horz" lIns="274320" tIns="182880" rIns="274320" bIns="182880" rtlCol="0" anchor="ctr" anchorCtr="1">
+            <a:normAutofit/>
+          </a:bodyPr>
+          <a:lstStyle/>
+          <a:p>
+            <a:r>
+              <a:rPr lang="en-US" sz="3800" kern="1200" cap="all" spc="200" baseline="0" dirty="0">
+                <a:solidFill>
+                  <a:srgbClr val="262626"/>
+                </a:solidFill>
+                <a:latin typeface="+mj-lt"/>
+                <a:ea typeface="+mj-ea"/>
+                <a:cs typeface="+mj-cs"/>
+              </a:rPr>
+              <a:t>Layers of abstraction</a:t>
+            </a:r>
+          </a:p>
+        </p:txBody>
+      </p:sp>
+    </p:spTree>
+    <p:extLst>
+      <p:ext uri="{BB962C8B-B14F-4D97-AF65-F5344CB8AC3E}">
+        <p14:creationId xmlns:p14="http://schemas.microsoft.com/office/powerpoint/2010/main" val="2976599677"/>
+      </p:ext>
+    </p:extLst>
+  </p:cSld>
+  <p:clrMapOvr>
+    <a:masterClrMapping/>
+  </p:clrMapOvr>
+</p:sld>
+</file>
+
+<file path=ppt/slides/slide6.xml><?xml version="1.0" encoding="utf-8"?>
+<p:sld xmlns:a="http://schemas.openxmlformats.org/drawingml/2006/main" xmlns:r="http://schemas.openxmlformats.org/officeDocument/2006/relationships" xmlns:p="http://schemas.openxmlformats.org/presentationml/2006/main">
+  <p:cSld>
+    <p:bg>
+      <p:bgPr>
+        <a:solidFill>
+          <a:schemeClr val="accent2"/>
+        </a:solidFill>
+        <a:effectLst/>
+      </p:bgPr>
+    </p:bg>
+    <p:spTree>
+      <p:nvGrpSpPr>
+        <p:cNvPr id="1" name=""/>
+        <p:cNvGrpSpPr/>
+        <p:nvPr/>
+      </p:nvGrpSpPr>
+      <p:grpSpPr>
+        <a:xfrm>
+          <a:off x="0" y="0"/>
+          <a:ext cx="0" cy="0"/>
+          <a:chOff x="0" y="0"/>
+          <a:chExt cx="0" cy="0"/>
+        </a:xfrm>
+      </p:grpSpPr>
+      <p:sp>
+        <p:nvSpPr>
           <p:cNvPr id="2" name="Title 1">
             <a:extLst>
               <a:ext uri="{FF2B5EF4-FFF2-40B4-BE49-F238E27FC236}">
@@ -5961,8 +6706,13 @@
           </a:bodyPr>
           <a:lstStyle/>
           <a:p>
-            <a:r>
-              <a:rPr lang="en-US" sz="1600" dirty="0">
+            <a:pPr>
+              <a:lnSpc>
+                <a:spcPct val="150000"/>
+              </a:lnSpc>
+            </a:pPr>
+            <a:r>
+              <a:rPr lang="en-US" sz="1800" dirty="0">
                 <a:solidFill>
                   <a:schemeClr val="bg1"/>
                 </a:solidFill>
@@ -5971,8 +6721,13 @@
             </a:r>
           </a:p>
           <a:p>
-            <a:r>
-              <a:rPr lang="en-US" sz="1600" dirty="0">
+            <a:pPr>
+              <a:lnSpc>
+                <a:spcPct val="150000"/>
+              </a:lnSpc>
+            </a:pPr>
+            <a:r>
+              <a:rPr lang="en-US" sz="1800" dirty="0">
                 <a:solidFill>
                   <a:schemeClr val="bg1"/>
                 </a:solidFill>
@@ -5981,8 +6736,13 @@
             </a:r>
           </a:p>
           <a:p>
-            <a:r>
-              <a:rPr lang="en-US" sz="1600" dirty="0">
+            <a:pPr>
+              <a:lnSpc>
+                <a:spcPct val="150000"/>
+              </a:lnSpc>
+            </a:pPr>
+            <a:r>
+              <a:rPr lang="en-US" sz="1800" dirty="0">
                 <a:solidFill>
                   <a:schemeClr val="bg1"/>
                 </a:solidFill>
@@ -5992,11 +6752,14 @@
           </a:p>
           <a:p>
             <a:pPr marL="342900" indent="-285750">
+              <a:lnSpc>
+                <a:spcPct val="150000"/>
+              </a:lnSpc>
               <a:buFont typeface="Courier New" panose="02070309020205020404" pitchFamily="49" charset="0"/>
               <a:buChar char="o"/>
             </a:pPr>
             <a:r>
-              <a:rPr lang="en-US" sz="1600" dirty="0">
+              <a:rPr lang="en-US" sz="1800" dirty="0">
                 <a:solidFill>
                   <a:schemeClr val="bg1"/>
                 </a:solidFill>
@@ -6005,7 +6768,7 @@
               <a:t>Mysql</a:t>
             </a:r>
             <a:r>
-              <a:rPr lang="en-US" sz="1600" dirty="0">
+              <a:rPr lang="en-US" sz="1800" dirty="0">
                 <a:solidFill>
                   <a:schemeClr val="bg1"/>
                 </a:solidFill>
@@ -6015,11 +6778,14 @@
           </a:p>
           <a:p>
             <a:pPr marL="342900" indent="-285750">
+              <a:lnSpc>
+                <a:spcPct val="150000"/>
+              </a:lnSpc>
               <a:buFont typeface="Courier New" panose="02070309020205020404" pitchFamily="49" charset="0"/>
               <a:buChar char="o"/>
             </a:pPr>
             <a:r>
-              <a:rPr lang="en-US" sz="1600" dirty="0">
+              <a:rPr lang="en-US" sz="1800" dirty="0">
                 <a:solidFill>
                   <a:schemeClr val="bg1"/>
                 </a:solidFill>
@@ -6028,7 +6794,7 @@
               <a:t>PG</a:t>
             </a:r>
             <a:r>
-              <a:rPr lang="en-US" sz="1600" dirty="0">
+              <a:rPr lang="en-US" sz="1800" dirty="0">
                 <a:solidFill>
                   <a:schemeClr val="bg1"/>
                 </a:solidFill>
@@ -6038,11 +6804,14 @@
           </a:p>
           <a:p>
             <a:pPr marL="342900" indent="-285750">
+              <a:lnSpc>
+                <a:spcPct val="150000"/>
+              </a:lnSpc>
               <a:buFont typeface="Courier New" panose="02070309020205020404" pitchFamily="49" charset="0"/>
               <a:buChar char="o"/>
             </a:pPr>
             <a:r>
-              <a:rPr lang="en-US" sz="1600" dirty="0">
+              <a:rPr lang="en-US" sz="1800" dirty="0">
                 <a:solidFill>
                   <a:schemeClr val="bg1"/>
                 </a:solidFill>
@@ -6051,7 +6820,7 @@
               <a:t>Sqlite3</a:t>
             </a:r>
             <a:r>
-              <a:rPr lang="en-US" sz="1600" dirty="0">
+              <a:rPr lang="en-US" sz="1800" dirty="0">
                 <a:solidFill>
                   <a:schemeClr val="bg1"/>
                 </a:solidFill>
@@ -6061,11 +6830,14 @@
           </a:p>
           <a:p>
             <a:pPr marL="342900" indent="-285750">
+              <a:lnSpc>
+                <a:spcPct val="150000"/>
+              </a:lnSpc>
               <a:buFont typeface="Courier New" panose="02070309020205020404" pitchFamily="49" charset="0"/>
               <a:buChar char="o"/>
             </a:pPr>
             <a:r>
-              <a:rPr lang="en-US" sz="1600" dirty="0">
+              <a:rPr lang="en-US" sz="1800" dirty="0">
                 <a:solidFill>
                   <a:schemeClr val="bg1"/>
                 </a:solidFill>
@@ -6074,7 +6846,7 @@
               <a:t>MongoDB</a:t>
             </a:r>
             <a:r>
-              <a:rPr lang="en-US" sz="1600" dirty="0">
+              <a:rPr lang="en-US" sz="1800" dirty="0">
                 <a:solidFill>
                   <a:schemeClr val="bg1"/>
                 </a:solidFill>
@@ -6088,301 +6860,6 @@
     <p:extLst>
       <p:ext uri="{BB962C8B-B14F-4D97-AF65-F5344CB8AC3E}">
         <p14:creationId xmlns:p14="http://schemas.microsoft.com/office/powerpoint/2010/main" val="402828261"/>
-      </p:ext>
-    </p:extLst>
-  </p:cSld>
-  <p:clrMapOvr>
-    <a:overrideClrMapping bg1="dk1" tx1="lt1" bg2="dk2" tx2="lt2" accent1="accent1" accent2="accent2" accent3="accent3" accent4="accent4" accent5="accent5" accent6="accent6" hlink="hlink" folHlink="folHlink"/>
-  </p:clrMapOvr>
-</p:sld>
-</file>
-
-<file path=ppt/slides/slide6.xml><?xml version="1.0" encoding="utf-8"?>
-<p:sld xmlns:a="http://schemas.openxmlformats.org/drawingml/2006/main" xmlns:r="http://schemas.openxmlformats.org/officeDocument/2006/relationships" xmlns:p="http://schemas.openxmlformats.org/presentationml/2006/main">
-  <p:cSld>
-    <p:bg>
-      <p:bgPr>
-        <a:solidFill>
-          <a:schemeClr val="accent2"/>
-        </a:solidFill>
-        <a:effectLst/>
-      </p:bgPr>
-    </p:bg>
-    <p:spTree>
-      <p:nvGrpSpPr>
-        <p:cNvPr id="1" name=""/>
-        <p:cNvGrpSpPr/>
-        <p:nvPr/>
-      </p:nvGrpSpPr>
-      <p:grpSpPr>
-        <a:xfrm>
-          <a:off x="0" y="0"/>
-          <a:ext cx="0" cy="0"/>
-          <a:chOff x="0" y="0"/>
-          <a:chExt cx="0" cy="0"/>
-        </a:xfrm>
-      </p:grpSpPr>
-      <p:sp>
-        <p:nvSpPr>
-          <p:cNvPr id="2" name="Title 1">
-            <a:extLst>
-              <a:ext uri="{FF2B5EF4-FFF2-40B4-BE49-F238E27FC236}">
-                <a16:creationId xmlns:a16="http://schemas.microsoft.com/office/drawing/2014/main" id="{F0B9A8EF-7938-EC4C-B7DA-1775636F5F5E}"/>
-              </a:ext>
-            </a:extLst>
-          </p:cNvPr>
-          <p:cNvSpPr>
-            <a:spLocks noGrp="1"/>
-          </p:cNvSpPr>
-          <p:nvPr>
-            <p:ph type="title"/>
-          </p:nvPr>
-        </p:nvSpPr>
-        <p:spPr>
-          <a:xfrm>
-            <a:off x="829781" y="2708804"/>
-            <a:ext cx="3698803" cy="1440394"/>
-          </a:xfrm>
-          <a:noFill/>
-          <a:ln>
-            <a:solidFill>
-              <a:schemeClr val="tx1"/>
-            </a:solidFill>
-          </a:ln>
-        </p:spPr>
-        <p:txBody>
-          <a:bodyPr vert="horz" lIns="182880" tIns="182880" rIns="182880" bIns="182880" rtlCol="0" anchor="ctr">
-            <a:normAutofit/>
-          </a:bodyPr>
-          <a:lstStyle/>
-          <a:p>
-            <a:pPr algn="ctr"/>
-            <a:r>
-              <a:rPr lang="en-US" kern="1200" cap="all" spc="200" baseline="0" dirty="0">
-                <a:solidFill>
-                  <a:schemeClr val="tx1"/>
-                </a:solidFill>
-                <a:latin typeface="+mj-lt"/>
-                <a:ea typeface="+mj-ea"/>
-                <a:cs typeface="+mj-cs"/>
-              </a:rPr>
-              <a:t>Mid level</a:t>
-            </a:r>
-            <a:br>
-              <a:rPr lang="en-US" kern="1200" cap="all" spc="200" baseline="0" dirty="0">
-                <a:solidFill>
-                  <a:schemeClr val="tx1"/>
-                </a:solidFill>
-                <a:latin typeface="+mj-lt"/>
-                <a:ea typeface="+mj-ea"/>
-                <a:cs typeface="+mj-cs"/>
-              </a:rPr>
-            </a:br>
-            <a:r>
-              <a:rPr lang="en-US" sz="1800" dirty="0">
-                <a:solidFill>
-                  <a:schemeClr val="tx1"/>
-                </a:solidFill>
-              </a:rPr>
-              <a:t>(query builder</a:t>
-            </a:r>
-            <a:r>
-              <a:rPr lang="en-US" sz="1800" kern="1200" cap="all" spc="200" baseline="0" dirty="0">
-                <a:solidFill>
-                  <a:schemeClr val="tx1"/>
-                </a:solidFill>
-                <a:latin typeface="+mj-lt"/>
-                <a:ea typeface="+mj-ea"/>
-                <a:cs typeface="+mj-cs"/>
-              </a:rPr>
-              <a:t>)</a:t>
-            </a:r>
-          </a:p>
-        </p:txBody>
-      </p:sp>
-      <p:sp>
-        <p:nvSpPr>
-          <p:cNvPr id="28" name="Rectangle 8">
-            <a:extLst>
-              <a:ext uri="{FF2B5EF4-FFF2-40B4-BE49-F238E27FC236}">
-                <a16:creationId xmlns:a16="http://schemas.microsoft.com/office/drawing/2014/main" id="{FB403EBD-907E-4D59-98D4-A72CD1063C62}"/>
-              </a:ext>
-              <a:ext uri="{C183D7F6-B498-43B3-948B-1728B52AA6E4}">
-                <adec:decorative xmlns:adec="http://schemas.microsoft.com/office/drawing/2017/decorative" val="1"/>
-              </a:ext>
-            </a:extLst>
-          </p:cNvPr>
-          <p:cNvSpPr>
-            <a:spLocks noGrp="1" noRot="1" noChangeAspect="1" noMove="1" noResize="1" noEditPoints="1" noAdjustHandles="1" noChangeArrowheads="1" noChangeShapeType="1" noTextEdit="1"/>
-          </p:cNvSpPr>
-          <p:nvPr>
-            <p:extLst>
-              <p:ext uri="{386F3935-93C4-4BCD-93E2-E3B085C9AB24}">
-                <p16:designElem xmlns:p16="http://schemas.microsoft.com/office/powerpoint/2015/main" val="1"/>
-              </p:ext>
-            </p:extLst>
-          </p:nvPr>
-        </p:nvSpPr>
-        <p:spPr>
-          <a:xfrm>
-            <a:off x="5315061" y="-2"/>
-            <a:ext cx="6876939" cy="6858002"/>
-          </a:xfrm>
-          <a:prstGeom prst="rect">
-            <a:avLst/>
-          </a:prstGeom>
-          <a:solidFill>
-            <a:schemeClr val="tx1">
-              <a:lumMod val="95000"/>
-            </a:schemeClr>
-          </a:solidFill>
-          <a:ln>
-            <a:noFill/>
-          </a:ln>
-        </p:spPr>
-        <p:style>
-          <a:lnRef idx="2">
-            <a:schemeClr val="accent1">
-              <a:shade val="50000"/>
-            </a:schemeClr>
-          </a:lnRef>
-          <a:fillRef idx="1">
-            <a:schemeClr val="accent1"/>
-          </a:fillRef>
-          <a:effectRef idx="0">
-            <a:schemeClr val="accent1"/>
-          </a:effectRef>
-          <a:fontRef idx="minor">
-            <a:schemeClr val="lt1"/>
-          </a:fontRef>
-        </p:style>
-        <p:txBody>
-          <a:bodyPr rtlCol="0" anchor="ctr"/>
-          <a:lstStyle/>
-          <a:p>
-            <a:pPr algn="ctr"/>
-            <a:endParaRPr lang="en-US"/>
-          </a:p>
-        </p:txBody>
-      </p:sp>
-      <p:sp>
-        <p:nvSpPr>
-          <p:cNvPr id="29" name="Text Placeholder 3">
-            <a:extLst>
-              <a:ext uri="{FF2B5EF4-FFF2-40B4-BE49-F238E27FC236}">
-                <a16:creationId xmlns:a16="http://schemas.microsoft.com/office/drawing/2014/main" id="{0DF59C08-DC63-9044-9CA4-013AF1DFE019}"/>
-              </a:ext>
-            </a:extLst>
-          </p:cNvPr>
-          <p:cNvSpPr>
-            <a:spLocks noGrp="1"/>
-          </p:cNvSpPr>
-          <p:nvPr>
-            <p:ph type="body" sz="half" idx="2"/>
-          </p:nvPr>
-        </p:nvSpPr>
-        <p:spPr>
-          <a:xfrm>
-            <a:off x="6049182" y="802638"/>
-            <a:ext cx="5408696" cy="5252722"/>
-          </a:xfrm>
-        </p:spPr>
-        <p:txBody>
-          <a:bodyPr vert="horz" lIns="91440" tIns="45720" rIns="91440" bIns="45720" rtlCol="0" anchor="ctr">
-            <a:normAutofit/>
-          </a:bodyPr>
-          <a:lstStyle/>
-          <a:p>
-            <a:r>
-              <a:rPr lang="en-US" sz="1600" dirty="0">
-                <a:solidFill>
-                  <a:schemeClr val="bg1"/>
-                </a:solidFill>
-              </a:rPr>
-              <a:t>In this approach, you choose which low-level </a:t>
-            </a:r>
-            <a:r>
-              <a:rPr lang="en-US" sz="1600" dirty="0" err="1">
-                <a:solidFill>
-                  <a:schemeClr val="bg1"/>
-                </a:solidFill>
-              </a:rPr>
-              <a:t>db</a:t>
-            </a:r>
-            <a:r>
-              <a:rPr lang="en-US" sz="1600" dirty="0">
-                <a:solidFill>
-                  <a:schemeClr val="bg1"/>
-                </a:solidFill>
-              </a:rPr>
-              <a:t> drive you would like to use, and then use dynamic chained functions to produce </a:t>
-            </a:r>
-            <a:r>
-              <a:rPr lang="en-US" sz="1600" dirty="0" err="1">
-                <a:solidFill>
-                  <a:schemeClr val="bg1"/>
-                </a:solidFill>
-              </a:rPr>
-              <a:t>db</a:t>
-            </a:r>
-            <a:r>
-              <a:rPr lang="en-US" sz="1600" dirty="0">
-                <a:solidFill>
-                  <a:schemeClr val="bg1"/>
-                </a:solidFill>
-              </a:rPr>
-              <a:t> queries. </a:t>
-            </a:r>
-          </a:p>
-          <a:p>
-            <a:r>
-              <a:rPr lang="en-US" sz="1600" dirty="0">
-                <a:solidFill>
-                  <a:schemeClr val="bg1"/>
-                </a:solidFill>
-              </a:rPr>
-              <a:t>Most notable package in </a:t>
-            </a:r>
-            <a:r>
-              <a:rPr lang="en-US" sz="1600" dirty="0" err="1">
-                <a:solidFill>
-                  <a:schemeClr val="bg1"/>
-                </a:solidFill>
-              </a:rPr>
-              <a:t>Node.JS</a:t>
-            </a:r>
-            <a:r>
-              <a:rPr lang="en-US" sz="1600" dirty="0">
-                <a:solidFill>
-                  <a:schemeClr val="bg1"/>
-                </a:solidFill>
-              </a:rPr>
-              <a:t> for this approach is </a:t>
-            </a:r>
-            <a:r>
-              <a:rPr lang="en-US" sz="1600" dirty="0">
-                <a:solidFill>
-                  <a:schemeClr val="bg1"/>
-                </a:solidFill>
-                <a:hlinkClick r:id="rId2"/>
-              </a:rPr>
-              <a:t>knex</a:t>
-            </a:r>
-            <a:r>
-              <a:rPr lang="en-US" sz="1600" dirty="0">
-                <a:solidFill>
-                  <a:schemeClr val="bg1"/>
-                </a:solidFill>
-              </a:rPr>
-              <a:t> (~300k downloads / week).</a:t>
-            </a:r>
-          </a:p>
-        </p:txBody>
-      </p:sp>
-    </p:spTree>
-    <p:extLst>
-      <p:ext uri="{BB962C8B-B14F-4D97-AF65-F5344CB8AC3E}">
-        <p14:creationId xmlns:p14="http://schemas.microsoft.com/office/powerpoint/2010/main" val="2269929646"/>
       </p:ext>
     </p:extLst>
   </p:cSld>
@@ -6461,7 +6938,7 @@
                 <a:ea typeface="+mj-ea"/>
                 <a:cs typeface="+mj-cs"/>
               </a:rPr>
-              <a:t>High level</a:t>
+              <a:t>Mid level</a:t>
             </a:r>
             <a:br>
               <a:rPr lang="en-US" kern="1200" cap="all" spc="200" baseline="0" dirty="0">
@@ -6479,7 +6956,7 @@
                   <a:schemeClr val="tx1"/>
                 </a:solidFill>
               </a:rPr>
-              <a:t>(ORM</a:t>
+              <a:t>(query builder</a:t>
             </a:r>
             <a:r>
               <a:rPr lang="en-US" sz="1800" kern="1200" cap="all" spc="200" baseline="0" dirty="0">
@@ -6588,131 +7065,98 @@
           </a:bodyPr>
           <a:lstStyle/>
           <a:p>
-            <a:r>
-              <a:rPr lang="en-US" sz="1600" dirty="0">
+            <a:pPr>
+              <a:lnSpc>
+                <a:spcPct val="150000"/>
+              </a:lnSpc>
+            </a:pPr>
+            <a:r>
+              <a:rPr lang="en-US" sz="1800" dirty="0">
                 <a:solidFill>
                   <a:schemeClr val="bg1"/>
                 </a:solidFill>
               </a:rPr>
-              <a:t>This is the highest level of abstraction we’re going to consider. ORM (=Object-relational mapping) is basically the wish to map records in our database to an object in our application, and this way use our database in a transparent way without worrying too much about the actual queries that are being sent.</a:t>
-            </a:r>
-          </a:p>
-          <a:p>
-            <a:r>
-              <a:rPr lang="en-US" sz="1600" dirty="0">
+              <a:t>In this approach, you choose which low-level </a:t>
+            </a:r>
+            <a:r>
+              <a:rPr lang="en-US" sz="1800" dirty="0" err="1">
                 <a:solidFill>
                   <a:schemeClr val="bg1"/>
                 </a:solidFill>
               </a:rPr>
-              <a:t>For NodeJS, here are some popular packages:</a:t>
-            </a:r>
-          </a:p>
-          <a:p>
-            <a:pPr marL="342900" indent="-285750">
-              <a:buFont typeface="Courier New" panose="02070309020205020404" pitchFamily="49" charset="0"/>
-              <a:buChar char="o"/>
+              <a:t>db</a:t>
+            </a:r>
+            <a:r>
+              <a:rPr lang="en-US" sz="1800" dirty="0">
+                <a:solidFill>
+                  <a:schemeClr val="bg1"/>
+                </a:solidFill>
+              </a:rPr>
+              <a:t> drive you would like to use, and then use dynamic chained functions to produce </a:t>
+            </a:r>
+            <a:r>
+              <a:rPr lang="en-US" sz="1800" dirty="0" err="1">
+                <a:solidFill>
+                  <a:schemeClr val="bg1"/>
+                </a:solidFill>
+              </a:rPr>
+              <a:t>db</a:t>
+            </a:r>
+            <a:r>
+              <a:rPr lang="en-US" sz="1800" dirty="0">
+                <a:solidFill>
+                  <a:schemeClr val="bg1"/>
+                </a:solidFill>
+              </a:rPr>
+              <a:t> queries. </a:t>
+            </a:r>
+          </a:p>
+          <a:p>
+            <a:pPr>
+              <a:lnSpc>
+                <a:spcPct val="150000"/>
+              </a:lnSpc>
             </a:pPr>
             <a:r>
-              <a:rPr lang="en-US" sz="1600" dirty="0">
+              <a:rPr lang="en-US" sz="1800" dirty="0">
+                <a:solidFill>
+                  <a:schemeClr val="bg1"/>
+                </a:solidFill>
+              </a:rPr>
+              <a:t>Most notable package in </a:t>
+            </a:r>
+            <a:r>
+              <a:rPr lang="en-US" sz="1800" dirty="0" err="1">
+                <a:solidFill>
+                  <a:schemeClr val="bg1"/>
+                </a:solidFill>
+              </a:rPr>
+              <a:t>Node.JS</a:t>
+            </a:r>
+            <a:r>
+              <a:rPr lang="en-US" sz="1800" dirty="0">
+                <a:solidFill>
+                  <a:schemeClr val="bg1"/>
+                </a:solidFill>
+              </a:rPr>
+              <a:t> for this approach is </a:t>
+            </a:r>
+            <a:r>
+              <a:rPr lang="en-US" sz="1800" dirty="0">
                 <a:solidFill>
                   <a:schemeClr val="bg1"/>
                 </a:solidFill>
                 <a:hlinkClick r:id="rId2"/>
               </a:rPr>
-              <a:t>Sequelize</a:t>
-            </a:r>
-            <a:r>
-              <a:rPr lang="en-US" sz="1600" dirty="0">
+              <a:t>knex</a:t>
+            </a:r>
+            <a:r>
+              <a:rPr lang="en-US" sz="1800" dirty="0">
                 <a:solidFill>
                   <a:schemeClr val="bg1"/>
                 </a:solidFill>
               </a:rPr>
-              <a:t> – ~350k downloads / week</a:t>
-            </a:r>
-          </a:p>
-          <a:p>
-            <a:pPr marL="342900" indent="-285750">
-              <a:buFont typeface="Courier New" panose="02070309020205020404" pitchFamily="49" charset="0"/>
-              <a:buChar char="o"/>
-            </a:pPr>
-            <a:r>
-              <a:rPr lang="en-US" sz="1600" dirty="0">
-                <a:solidFill>
-                  <a:schemeClr val="bg1"/>
-                </a:solidFill>
-                <a:hlinkClick r:id="rId3"/>
-              </a:rPr>
-              <a:t>Bookshelf</a:t>
-            </a:r>
-            <a:r>
-              <a:rPr lang="en-US" sz="1600" dirty="0">
-                <a:solidFill>
-                  <a:schemeClr val="bg1"/>
-                </a:solidFill>
-              </a:rPr>
-              <a:t> (</a:t>
-            </a:r>
-            <a:r>
-              <a:rPr lang="en-US" sz="1600" dirty="0" err="1">
-                <a:solidFill>
-                  <a:schemeClr val="bg1"/>
-                </a:solidFill>
-              </a:rPr>
-              <a:t>knex</a:t>
-            </a:r>
-            <a:r>
-              <a:rPr lang="en-US" sz="1600" dirty="0">
-                <a:solidFill>
-                  <a:schemeClr val="bg1"/>
-                </a:solidFill>
-              </a:rPr>
-              <a:t> based) - ~35k downloads / week</a:t>
-            </a:r>
-          </a:p>
-          <a:p>
-            <a:pPr marL="342900" indent="-285750">
-              <a:buFont typeface="Courier New" panose="02070309020205020404" pitchFamily="49" charset="0"/>
-              <a:buChar char="o"/>
-            </a:pPr>
-            <a:r>
-              <a:rPr lang="en-US" sz="1600" dirty="0">
-                <a:solidFill>
-                  <a:schemeClr val="bg1"/>
-                </a:solidFill>
-                <a:hlinkClick r:id="rId4"/>
-              </a:rPr>
-              <a:t>Waterline</a:t>
-            </a:r>
-            <a:r>
-              <a:rPr lang="en-US" sz="1600" dirty="0">
-                <a:solidFill>
-                  <a:schemeClr val="bg1"/>
-                </a:solidFill>
-              </a:rPr>
-              <a:t> - ~60k downloads / week</a:t>
-            </a:r>
-          </a:p>
-          <a:p>
-            <a:pPr marL="342900" indent="-285750">
-              <a:buFont typeface="Courier New" panose="02070309020205020404" pitchFamily="49" charset="0"/>
-              <a:buChar char="o"/>
-            </a:pPr>
-            <a:r>
-              <a:rPr lang="en-US" sz="1600" dirty="0">
-                <a:solidFill>
-                  <a:schemeClr val="bg1"/>
-                </a:solidFill>
-                <a:hlinkClick r:id="rId5"/>
-              </a:rPr>
-              <a:t>Objection</a:t>
-            </a:r>
-            <a:r>
-              <a:rPr lang="en-US" sz="1600" dirty="0">
-                <a:solidFill>
-                  <a:schemeClr val="bg1"/>
-                </a:solidFill>
-              </a:rPr>
-              <a:t> - ~35k downloads / week</a:t>
+              <a:t> (~300k downloads / week).</a:t>
             </a:r>
           </a:p>
         </p:txBody>
@@ -6720,7 +7164,7 @@
     </p:spTree>
     <p:extLst>
       <p:ext uri="{BB962C8B-B14F-4D97-AF65-F5344CB8AC3E}">
-        <p14:creationId xmlns:p14="http://schemas.microsoft.com/office/powerpoint/2010/main" val="2166237206"/>
+        <p14:creationId xmlns:p14="http://schemas.microsoft.com/office/powerpoint/2010/main" val="2269929646"/>
       </p:ext>
     </p:extLst>
   </p:cSld>
@@ -6733,6 +7177,14 @@
 <file path=ppt/slides/slide8.xml><?xml version="1.0" encoding="utf-8"?>
 <p:sld xmlns:a="http://schemas.openxmlformats.org/drawingml/2006/main" xmlns:r="http://schemas.openxmlformats.org/officeDocument/2006/relationships" xmlns:p="http://schemas.openxmlformats.org/presentationml/2006/main">
   <p:cSld>
+    <p:bg>
+      <p:bgPr>
+        <a:solidFill>
+          <a:schemeClr val="accent2"/>
+        </a:solidFill>
+        <a:effectLst/>
+      </p:bgPr>
+    </p:bg>
     <p:spTree>
       <p:nvGrpSpPr>
         <p:cNvPr id="1" name=""/>
@@ -6752,7 +7204,7 @@
           <p:cNvPr id="2" name="Title 1">
             <a:extLst>
               <a:ext uri="{FF2B5EF4-FFF2-40B4-BE49-F238E27FC236}">
-                <a16:creationId xmlns:a16="http://schemas.microsoft.com/office/drawing/2014/main" id="{E792511F-CEB8-7041-966C-AE77F40B6A47}"/>
+                <a16:creationId xmlns:a16="http://schemas.microsoft.com/office/drawing/2014/main" id="{F0B9A8EF-7938-EC4C-B7DA-1775636F5F5E}"/>
               </a:ext>
             </a:extLst>
           </p:cNvPr>
@@ -6763,137 +7215,334 @@
             <p:ph type="title"/>
           </p:nvPr>
         </p:nvSpPr>
-        <p:spPr/>
-        <p:txBody>
-          <a:bodyPr/>
-          <a:lstStyle/>
-          <a:p>
-            <a:r>
-              <a:rPr lang="en-US" dirty="0" err="1"/>
-              <a:t>Sequelize</a:t>
-            </a:r>
-            <a:r>
-              <a:rPr lang="en-US" dirty="0"/>
-              <a:t> limitations</a:t>
-            </a:r>
-          </a:p>
-        </p:txBody>
-      </p:sp>
-      <p:sp>
-        <p:nvSpPr>
-          <p:cNvPr id="3" name="Content Placeholder 2">
+        <p:spPr>
+          <a:xfrm>
+            <a:off x="829781" y="2708804"/>
+            <a:ext cx="3698803" cy="1440394"/>
+          </a:xfrm>
+          <a:noFill/>
+          <a:ln>
+            <a:solidFill>
+              <a:schemeClr val="tx1"/>
+            </a:solidFill>
+          </a:ln>
+        </p:spPr>
+        <p:txBody>
+          <a:bodyPr vert="horz" lIns="182880" tIns="182880" rIns="182880" bIns="182880" rtlCol="0" anchor="ctr">
+            <a:normAutofit/>
+          </a:bodyPr>
+          <a:lstStyle/>
+          <a:p>
+            <a:pPr algn="ctr"/>
+            <a:r>
+              <a:rPr lang="en-US" kern="1200" cap="all" spc="200" baseline="0" dirty="0">
+                <a:solidFill>
+                  <a:schemeClr val="tx1"/>
+                </a:solidFill>
+                <a:latin typeface="+mj-lt"/>
+                <a:ea typeface="+mj-ea"/>
+                <a:cs typeface="+mj-cs"/>
+              </a:rPr>
+              <a:t>High level</a:t>
+            </a:r>
+            <a:br>
+              <a:rPr lang="en-US" kern="1200" cap="all" spc="200" baseline="0" dirty="0">
+                <a:solidFill>
+                  <a:schemeClr val="tx1"/>
+                </a:solidFill>
+                <a:latin typeface="+mj-lt"/>
+                <a:ea typeface="+mj-ea"/>
+                <a:cs typeface="+mj-cs"/>
+              </a:rPr>
+            </a:br>
+            <a:r>
+              <a:rPr lang="en-US" sz="1800" dirty="0">
+                <a:solidFill>
+                  <a:schemeClr val="tx1"/>
+                </a:solidFill>
+              </a:rPr>
+              <a:t>(ORM</a:t>
+            </a:r>
+            <a:r>
+              <a:rPr lang="en-US" sz="1800" kern="1200" cap="all" spc="200" baseline="0" dirty="0">
+                <a:solidFill>
+                  <a:schemeClr val="tx1"/>
+                </a:solidFill>
+                <a:latin typeface="+mj-lt"/>
+                <a:ea typeface="+mj-ea"/>
+                <a:cs typeface="+mj-cs"/>
+              </a:rPr>
+              <a:t>)</a:t>
+            </a:r>
+          </a:p>
+        </p:txBody>
+      </p:sp>
+      <p:sp>
+        <p:nvSpPr>
+          <p:cNvPr id="28" name="Rectangle 8">
             <a:extLst>
               <a:ext uri="{FF2B5EF4-FFF2-40B4-BE49-F238E27FC236}">
-                <a16:creationId xmlns:a16="http://schemas.microsoft.com/office/drawing/2014/main" id="{302FE5B9-62BA-A447-B7C6-C0A71BA71993}"/>
+                <a16:creationId xmlns:a16="http://schemas.microsoft.com/office/drawing/2014/main" id="{FB403EBD-907E-4D59-98D4-A72CD1063C62}"/>
+              </a:ext>
+              <a:ext uri="{C183D7F6-B498-43B3-948B-1728B52AA6E4}">
+                <adec:decorative xmlns:adec="http://schemas.microsoft.com/office/drawing/2017/decorative" val="1"/>
               </a:ext>
             </a:extLst>
           </p:cNvPr>
           <p:cNvSpPr>
-            <a:spLocks noGrp="1"/>
-          </p:cNvSpPr>
-          <p:nvPr>
-            <p:ph idx="1"/>
-          </p:nvPr>
-        </p:nvSpPr>
-        <p:spPr/>
-        <p:txBody>
-          <a:bodyPr/>
+            <a:spLocks noGrp="1" noRot="1" noChangeAspect="1" noMove="1" noResize="1" noEditPoints="1" noAdjustHandles="1" noChangeArrowheads="1" noChangeShapeType="1" noTextEdit="1"/>
+          </p:cNvSpPr>
+          <p:nvPr>
+            <p:extLst>
+              <p:ext uri="{386F3935-93C4-4BCD-93E2-E3B085C9AB24}">
+                <p16:designElem xmlns:p16="http://schemas.microsoft.com/office/powerpoint/2015/main" val="1"/>
+              </p:ext>
+            </p:extLst>
+          </p:nvPr>
+        </p:nvSpPr>
+        <p:spPr>
+          <a:xfrm>
+            <a:off x="5315061" y="-2"/>
+            <a:ext cx="6876939" cy="6858002"/>
+          </a:xfrm>
+          <a:prstGeom prst="rect">
+            <a:avLst/>
+          </a:prstGeom>
+          <a:solidFill>
+            <a:schemeClr val="tx1">
+              <a:lumMod val="95000"/>
+            </a:schemeClr>
+          </a:solidFill>
+          <a:ln>
+            <a:noFill/>
+          </a:ln>
+        </p:spPr>
+        <p:style>
+          <a:lnRef idx="2">
+            <a:schemeClr val="accent1">
+              <a:shade val="50000"/>
+            </a:schemeClr>
+          </a:lnRef>
+          <a:fillRef idx="1">
+            <a:schemeClr val="accent1"/>
+          </a:fillRef>
+          <a:effectRef idx="0">
+            <a:schemeClr val="accent1"/>
+          </a:effectRef>
+          <a:fontRef idx="minor">
+            <a:schemeClr val="lt1"/>
+          </a:fontRef>
+        </p:style>
+        <p:txBody>
+          <a:bodyPr rtlCol="0" anchor="ctr"/>
+          <a:lstStyle/>
+          <a:p>
+            <a:pPr algn="ctr"/>
+            <a:endParaRPr lang="en-US"/>
+          </a:p>
+        </p:txBody>
+      </p:sp>
+      <p:sp>
+        <p:nvSpPr>
+          <p:cNvPr id="29" name="Text Placeholder 3">
+            <a:extLst>
+              <a:ext uri="{FF2B5EF4-FFF2-40B4-BE49-F238E27FC236}">
+                <a16:creationId xmlns:a16="http://schemas.microsoft.com/office/drawing/2014/main" id="{0DF59C08-DC63-9044-9CA4-013AF1DFE019}"/>
+              </a:ext>
+            </a:extLst>
+          </p:cNvPr>
+          <p:cNvSpPr>
+            <a:spLocks noGrp="1"/>
+          </p:cNvSpPr>
+          <p:nvPr>
+            <p:ph type="body" sz="half" idx="2"/>
+          </p:nvPr>
+        </p:nvSpPr>
+        <p:spPr>
+          <a:xfrm>
+            <a:off x="6049182" y="802638"/>
+            <a:ext cx="5408696" cy="5252722"/>
+          </a:xfrm>
+        </p:spPr>
+        <p:txBody>
+          <a:bodyPr vert="horz" lIns="91440" tIns="45720" rIns="91440" bIns="45720" rtlCol="0" anchor="ctr">
+            <a:normAutofit fontScale="92500" lnSpcReduction="10000"/>
+          </a:bodyPr>
           <a:lstStyle/>
           <a:p>
             <a:pPr>
-              <a:buClr>
-                <a:srgbClr val="FF0000"/>
-              </a:buClr>
+              <a:lnSpc>
+                <a:spcPct val="150000"/>
+              </a:lnSpc>
             </a:pPr>
             <a:r>
-              <a:rPr lang="en-US" dirty="0"/>
-              <a:t>No support for composite primary key (when using foreign keys) – </a:t>
-            </a:r>
-            <a:r>
-              <a:rPr lang="en-US" dirty="0">
+              <a:rPr lang="en-US" sz="1800" dirty="0">
+                <a:solidFill>
+                  <a:schemeClr val="bg1"/>
+                </a:solidFill>
+              </a:rPr>
+              <a:t>This is the highest level of abstraction we’re going to consider. ORM (=Object-relational mapping) is basically the wish to map records in our database to an object in our application, and this way use our database in a transparent way without worrying too much about the actual queries that are being sent.</a:t>
+            </a:r>
+          </a:p>
+          <a:p>
+            <a:pPr>
+              <a:lnSpc>
+                <a:spcPct val="150000"/>
+              </a:lnSpc>
+            </a:pPr>
+            <a:r>
+              <a:rPr lang="en-US" sz="1800" dirty="0">
+                <a:solidFill>
+                  <a:schemeClr val="bg1"/>
+                </a:solidFill>
+              </a:rPr>
+              <a:t>For NodeJS, here are some popular packages:</a:t>
+            </a:r>
+          </a:p>
+          <a:p>
+            <a:pPr marL="342900" indent="-285750">
+              <a:lnSpc>
+                <a:spcPct val="150000"/>
+              </a:lnSpc>
+              <a:buFont typeface="Courier New" panose="02070309020205020404" pitchFamily="49" charset="0"/>
+              <a:buChar char="o"/>
+            </a:pPr>
+            <a:r>
+              <a:rPr lang="en-US" sz="1800" dirty="0">
+                <a:solidFill>
+                  <a:schemeClr val="bg1"/>
+                </a:solidFill>
                 <a:hlinkClick r:id="rId2"/>
               </a:rPr>
-              <a:t>reference</a:t>
-            </a:r>
-            <a:endParaRPr lang="en-US" dirty="0"/>
-          </a:p>
-          <a:p>
-            <a:pPr>
-              <a:buClr>
-                <a:srgbClr val="FF0000"/>
-              </a:buClr>
+              <a:t>Sequelize</a:t>
+            </a:r>
+            <a:r>
+              <a:rPr lang="en-US" sz="1800" dirty="0">
+                <a:solidFill>
+                  <a:schemeClr val="bg1"/>
+                </a:solidFill>
+              </a:rPr>
+              <a:t> – ~350k downloads / week</a:t>
+            </a:r>
+          </a:p>
+          <a:p>
+            <a:pPr marL="342900" indent="-285750">
+              <a:lnSpc>
+                <a:spcPct val="150000"/>
+              </a:lnSpc>
+              <a:buFont typeface="Courier New" panose="02070309020205020404" pitchFamily="49" charset="0"/>
+              <a:buChar char="o"/>
             </a:pPr>
             <a:r>
-              <a:rPr lang="en-US" dirty="0"/>
-              <a:t>Limited support to the types of joins you can use (have to tweak around with association types to see an impact)</a:t>
-            </a:r>
-          </a:p>
-          <a:p>
-            <a:pPr>
-              <a:buClr>
-                <a:srgbClr val="FF0000"/>
-              </a:buClr>
+              <a:rPr lang="en-US" sz="1800" dirty="0">
+                <a:solidFill>
+                  <a:schemeClr val="bg1"/>
+                </a:solidFill>
+                <a:hlinkClick r:id="rId3"/>
+              </a:rPr>
+              <a:t>Bookshelf</a:t>
+            </a:r>
+            <a:r>
+              <a:rPr lang="en-US" sz="1800" dirty="0">
+                <a:solidFill>
+                  <a:schemeClr val="bg1"/>
+                </a:solidFill>
+              </a:rPr>
+              <a:t> (</a:t>
+            </a:r>
+            <a:r>
+              <a:rPr lang="en-US" sz="1800" dirty="0" err="1">
+                <a:solidFill>
+                  <a:schemeClr val="bg1"/>
+                </a:solidFill>
+              </a:rPr>
+              <a:t>knex</a:t>
+            </a:r>
+            <a:r>
+              <a:rPr lang="en-US" sz="1800" dirty="0">
+                <a:solidFill>
+                  <a:schemeClr val="bg1"/>
+                </a:solidFill>
+              </a:rPr>
+              <a:t> based) - ~35k downloads / week</a:t>
+            </a:r>
+          </a:p>
+          <a:p>
+            <a:pPr marL="342900" indent="-285750">
+              <a:lnSpc>
+                <a:spcPct val="150000"/>
+              </a:lnSpc>
+              <a:buFont typeface="Courier New" panose="02070309020205020404" pitchFamily="49" charset="0"/>
+              <a:buChar char="o"/>
             </a:pPr>
             <a:r>
-              <a:rPr lang="en-US" dirty="0"/>
-              <a:t>Very abstract </a:t>
-            </a:r>
-            <a:r>
-              <a:rPr lang="en-US" dirty="0" err="1"/>
-              <a:t>sql</a:t>
-            </a:r>
-            <a:r>
-              <a:rPr lang="en-US" dirty="0"/>
-              <a:t> query that is hard to debug</a:t>
-            </a:r>
-          </a:p>
-          <a:p>
-            <a:pPr>
-              <a:buClr>
-                <a:srgbClr val="FF0000"/>
-              </a:buClr>
+              <a:rPr lang="en-US" sz="1800" dirty="0">
+                <a:solidFill>
+                  <a:schemeClr val="bg1"/>
+                </a:solidFill>
+                <a:hlinkClick r:id="rId4"/>
+              </a:rPr>
+              <a:t>Waterline</a:t>
+            </a:r>
+            <a:r>
+              <a:rPr lang="en-US" sz="1800" dirty="0">
+                <a:solidFill>
+                  <a:schemeClr val="bg1"/>
+                </a:solidFill>
+              </a:rPr>
+              <a:t> - ~60k downloads / week</a:t>
+            </a:r>
+          </a:p>
+          <a:p>
+            <a:pPr marL="342900" indent="-285750">
+              <a:lnSpc>
+                <a:spcPct val="150000"/>
+              </a:lnSpc>
+              <a:buFont typeface="Courier New" panose="02070309020205020404" pitchFamily="49" charset="0"/>
+              <a:buChar char="o"/>
             </a:pPr>
             <a:r>
-              <a:rPr lang="en-US" dirty="0"/>
-              <a:t>Very easy to use filters without them being primary keys or secondary indexes</a:t>
-            </a:r>
-          </a:p>
-          <a:p>
-            <a:pPr>
-              <a:buClr>
-                <a:srgbClr val="FF0000"/>
-              </a:buClr>
+              <a:rPr lang="en-US" sz="1800" dirty="0">
+                <a:solidFill>
+                  <a:schemeClr val="bg1"/>
+                </a:solidFill>
+                <a:hlinkClick r:id="rId5"/>
+              </a:rPr>
+              <a:t>Objection</a:t>
+            </a:r>
+            <a:r>
+              <a:rPr lang="en-US" sz="1800" dirty="0">
+                <a:solidFill>
+                  <a:schemeClr val="bg1"/>
+                </a:solidFill>
+              </a:rPr>
+              <a:t> - ~35k downloads / week</a:t>
+            </a:r>
+          </a:p>
+          <a:p>
+            <a:pPr marL="342900" indent="-285750">
+              <a:lnSpc>
+                <a:spcPct val="150000"/>
+              </a:lnSpc>
+              <a:buFont typeface="Courier New" panose="02070309020205020404" pitchFamily="49" charset="0"/>
+              <a:buChar char="o"/>
             </a:pPr>
             <a:r>
-              <a:rPr lang="en-US" dirty="0"/>
-              <a:t>Foreign key representation is pretty hard (especially Many-to-Many)</a:t>
-            </a:r>
-          </a:p>
-          <a:p>
-            <a:pPr>
-              <a:buClr>
-                <a:srgbClr val="FF0000"/>
-              </a:buClr>
-            </a:pPr>
-            <a:r>
-              <a:rPr lang="en-US" dirty="0"/>
-              <a:t>Models force you to have “default” properties (i.e. </a:t>
-            </a:r>
-            <a:r>
-              <a:rPr lang="en-US" dirty="0" err="1"/>
-              <a:t>createdAt</a:t>
-            </a:r>
-            <a:r>
-              <a:rPr lang="en-US" dirty="0"/>
-              <a:t>, </a:t>
-            </a:r>
-            <a:r>
-              <a:rPr lang="en-US" dirty="0" err="1"/>
-              <a:t>updatedAt</a:t>
-            </a:r>
-            <a:r>
-              <a:rPr lang="en-US" dirty="0"/>
-              <a:t>), and these may be disabled via some extra configuration</a:t>
+              <a:rPr lang="en-US" sz="1800" dirty="0">
+                <a:solidFill>
+                  <a:schemeClr val="bg1"/>
+                </a:solidFill>
+                <a:hlinkClick r:id="rId6"/>
+              </a:rPr>
+              <a:t>Mongoose</a:t>
+            </a:r>
+            <a:r>
+              <a:rPr lang="en-US" sz="1800" dirty="0">
+                <a:solidFill>
+                  <a:schemeClr val="bg1"/>
+                </a:solidFill>
+              </a:rPr>
+              <a:t> - ~520k downloads / week</a:t>
             </a:r>
           </a:p>
         </p:txBody>
@@ -6901,12 +7550,12 @@
     </p:spTree>
     <p:extLst>
       <p:ext uri="{BB962C8B-B14F-4D97-AF65-F5344CB8AC3E}">
-        <p14:creationId xmlns:p14="http://schemas.microsoft.com/office/powerpoint/2010/main" val="720539651"/>
+        <p14:creationId xmlns:p14="http://schemas.microsoft.com/office/powerpoint/2010/main" val="2166237206"/>
       </p:ext>
     </p:extLst>
   </p:cSld>
   <p:clrMapOvr>
-    <a:masterClrMapping/>
+    <a:overrideClrMapping bg1="dk1" tx1="lt1" bg2="dk2" tx2="lt2" accent1="accent1" accent2="accent2" accent3="accent3" accent4="accent4" accent5="accent5" accent6="accent6" hlink="hlink" folHlink="folHlink"/>
   </p:clrMapOvr>
 </p:sld>
 </file>

</xml_diff>